<commit_message>
update lecture 2, RStidio
</commit_message>
<xml_diff>
--- a/docs/lectures/RStudio.pptx
+++ b/docs/lectures/RStudio.pptx
@@ -5,10 +5,10 @@
     <p:sldMasterId id="2147483660" r:id="rId1"/>
   </p:sldMasterIdLst>
   <p:notesMasterIdLst>
-    <p:notesMasterId r:id="rId20"/>
+    <p:notesMasterId r:id="rId23"/>
   </p:notesMasterIdLst>
   <p:handoutMasterIdLst>
-    <p:handoutMasterId r:id="rId21"/>
+    <p:handoutMasterId r:id="rId24"/>
   </p:handoutMasterIdLst>
   <p:sldIdLst>
     <p:sldId id="256" r:id="rId2"/>
@@ -21,14 +21,17 @@
     <p:sldId id="263" r:id="rId9"/>
     <p:sldId id="264" r:id="rId10"/>
     <p:sldId id="265" r:id="rId11"/>
-    <p:sldId id="268" r:id="rId12"/>
-    <p:sldId id="269" r:id="rId13"/>
-    <p:sldId id="266" r:id="rId14"/>
-    <p:sldId id="267" r:id="rId15"/>
-    <p:sldId id="270" r:id="rId16"/>
-    <p:sldId id="271" r:id="rId17"/>
-    <p:sldId id="272" r:id="rId18"/>
-    <p:sldId id="273" r:id="rId19"/>
+    <p:sldId id="274" r:id="rId12"/>
+    <p:sldId id="275" r:id="rId13"/>
+    <p:sldId id="268" r:id="rId14"/>
+    <p:sldId id="269" r:id="rId15"/>
+    <p:sldId id="266" r:id="rId16"/>
+    <p:sldId id="267" r:id="rId17"/>
+    <p:sldId id="270" r:id="rId18"/>
+    <p:sldId id="271" r:id="rId19"/>
+    <p:sldId id="272" r:id="rId20"/>
+    <p:sldId id="273" r:id="rId21"/>
+    <p:sldId id="276" r:id="rId22"/>
   </p:sldIdLst>
   <p:sldSz cx="9144000" cy="6858000" type="screen4x3"/>
   <p:notesSz cx="6858000" cy="9144000"/>
@@ -128,6 +131,43 @@
     </a:lvl9pPr>
   </p:defaultTextStyle>
   <p:extLst>
+    <p:ext uri="{521415D9-36F7-43E2-AB2F-B90AF26B5E84}">
+      <p14:sectionLst xmlns:p14="http://schemas.microsoft.com/office/powerpoint/2010/main">
+        <p14:section name="Default Section" id="{7E071209-F4A4-4CAE-AD81-34C64A1495AB}">
+          <p14:sldIdLst>
+            <p14:sldId id="256"/>
+            <p14:sldId id="257"/>
+            <p14:sldId id="258"/>
+            <p14:sldId id="259"/>
+            <p14:sldId id="260"/>
+          </p14:sldIdLst>
+        </p14:section>
+        <p14:section name="Projects" id="{AA244298-2FEB-45C7-BC7C-95A99BB81683}">
+          <p14:sldIdLst>
+            <p14:sldId id="261"/>
+            <p14:sldId id="262"/>
+            <p14:sldId id="263"/>
+            <p14:sldId id="264"/>
+            <p14:sldId id="265"/>
+            <p14:sldId id="274"/>
+            <p14:sldId id="275"/>
+          </p14:sldIdLst>
+        </p14:section>
+        <p14:section name="Reproducible" id="{70AA86F7-FEDB-4679-9CA7-FE5B60771173}">
+          <p14:sldIdLst>
+            <p14:sldId id="268"/>
+            <p14:sldId id="269"/>
+            <p14:sldId id="266"/>
+            <p14:sldId id="267"/>
+            <p14:sldId id="270"/>
+            <p14:sldId id="271"/>
+            <p14:sldId id="272"/>
+            <p14:sldId id="273"/>
+            <p14:sldId id="276"/>
+          </p14:sldIdLst>
+        </p14:section>
+      </p14:sectionLst>
+    </p:ext>
     <p:ext uri="{EFAFB233-063F-42B5-8137-9DF3F51BA10A}">
       <p15:sldGuideLst xmlns:p15="http://schemas.microsoft.com/office/powerpoint/2012/main">
         <p15:guide id="1" orient="horz" pos="2160">
@@ -242,7 +282,7 @@
           <a:p>
             <a:fld id="{08BD4FA9-F3CE-45B3-A980-C331C6F1EF65}" type="datetimeFigureOut">
               <a:rPr lang="en-US" smtClean="0"/>
-              <a:t>12/9/2022</a:t>
+              <a:t>12/23/2022</a:t>
             </a:fld>
             <a:endParaRPr lang="en-US"/>
           </a:p>
@@ -407,7 +447,7 @@
           <a:p>
             <a:fld id="{4DD5792B-B5B4-4CD1-8610-9362680650DD}" type="datetimeFigureOut">
               <a:rPr lang="en-US" smtClean="0"/>
-              <a:t>12/9/2022</a:t>
+              <a:t>12/23/2022</a:t>
             </a:fld>
             <a:endParaRPr lang="en-US"/>
           </a:p>
@@ -948,7 +988,7 @@
           <a:p>
             <a:fld id="{EAAD3657-2200-4D14-82C0-10C39B0F0F06}" type="datetime1">
               <a:rPr lang="en-US" smtClean="0"/>
-              <a:t>12/9/2022</a:t>
+              <a:t>12/23/2022</a:t>
             </a:fld>
             <a:endParaRPr lang="en-US"/>
           </a:p>
@@ -1116,7 +1156,7 @@
           <a:p>
             <a:fld id="{11BBAF55-A85E-4993-914E-FC1E5AA7DF24}" type="datetime1">
               <a:rPr lang="en-US" smtClean="0"/>
-              <a:t>12/9/2022</a:t>
+              <a:t>12/23/2022</a:t>
             </a:fld>
             <a:endParaRPr lang="en-US"/>
           </a:p>
@@ -1294,7 +1334,7 @@
           <a:p>
             <a:fld id="{39816E07-E1DB-44A4-A5E5-9F4B54E8C933}" type="datetime1">
               <a:rPr lang="en-US" smtClean="0"/>
-              <a:t>12/9/2022</a:t>
+              <a:t>12/23/2022</a:t>
             </a:fld>
             <a:endParaRPr lang="en-US"/>
           </a:p>
@@ -1479,7 +1519,7 @@
           <a:p>
             <a:fld id="{C2B1AD17-B813-4477-8AFE-B1860CC59113}" type="datetime1">
               <a:rPr lang="en-US" smtClean="0"/>
-              <a:t>12/9/2022</a:t>
+              <a:t>12/23/2022</a:t>
             </a:fld>
             <a:endParaRPr lang="en-US"/>
           </a:p>
@@ -1724,7 +1764,7 @@
           <a:p>
             <a:fld id="{D0975C0D-5C9E-48CC-8D31-F42D19FA8F7A}" type="datetime1">
               <a:rPr lang="en-US" smtClean="0"/>
-              <a:t>12/9/2022</a:t>
+              <a:t>12/23/2022</a:t>
             </a:fld>
             <a:endParaRPr lang="en-US"/>
           </a:p>
@@ -2009,7 +2049,7 @@
           <a:p>
             <a:fld id="{28657551-0F2B-4F09-86FD-F7994CE83DC5}" type="datetime1">
               <a:rPr lang="en-US" smtClean="0"/>
-              <a:t>12/9/2022</a:t>
+              <a:t>12/23/2022</a:t>
             </a:fld>
             <a:endParaRPr lang="en-US"/>
           </a:p>
@@ -2428,7 +2468,7 @@
           <a:p>
             <a:fld id="{3929D2B2-4200-46B9-96C3-02A55D5FAA00}" type="datetime1">
               <a:rPr lang="en-US" smtClean="0"/>
-              <a:t>12/9/2022</a:t>
+              <a:t>12/23/2022</a:t>
             </a:fld>
             <a:endParaRPr lang="en-US"/>
           </a:p>
@@ -2545,7 +2585,7 @@
           <a:p>
             <a:fld id="{41FF7722-74E8-497F-A072-89677A2C2373}" type="datetime1">
               <a:rPr lang="en-US" smtClean="0"/>
-              <a:t>12/9/2022</a:t>
+              <a:t>12/23/2022</a:t>
             </a:fld>
             <a:endParaRPr lang="en-US"/>
           </a:p>
@@ -2640,7 +2680,7 @@
           <a:p>
             <a:fld id="{BD26212E-B46B-426F-AE59-AA326827D9E0}" type="datetime1">
               <a:rPr lang="en-US" smtClean="0"/>
-              <a:t>12/9/2022</a:t>
+              <a:t>12/23/2022</a:t>
             </a:fld>
             <a:endParaRPr lang="en-US"/>
           </a:p>
@@ -2915,7 +2955,7 @@
           <a:p>
             <a:fld id="{FB9B81E8-09EA-4684-A39F-38DE1E49D20C}" type="datetime1">
               <a:rPr lang="en-US" smtClean="0"/>
-              <a:t>12/9/2022</a:t>
+              <a:t>12/23/2022</a:t>
             </a:fld>
             <a:endParaRPr lang="en-US"/>
           </a:p>
@@ -3167,7 +3207,7 @@
           <a:p>
             <a:fld id="{35C5CC5F-056C-4047-9A5C-9F5B4BED129B}" type="datetime1">
               <a:rPr lang="en-US" smtClean="0"/>
-              <a:t>12/9/2022</a:t>
+              <a:t>12/23/2022</a:t>
             </a:fld>
             <a:endParaRPr lang="en-US"/>
           </a:p>
@@ -3381,7 +3421,7 @@
           <a:p>
             <a:fld id="{E8171053-07BD-4A17-AC24-0A22EAA36098}" type="datetime1">
               <a:rPr lang="en-US" smtClean="0"/>
-              <a:t>12/9/2022</a:t>
+              <a:t>12/23/2022</a:t>
             </a:fld>
             <a:endParaRPr lang="en-US"/>
           </a:p>
@@ -4365,7 +4405,13 @@
       </p:grpSpPr>
       <p:sp>
         <p:nvSpPr>
-          <p:cNvPr id="2" name="Title 1"/>
+          <p:cNvPr id="2" name="Title 1">
+            <a:extLst>
+              <a:ext uri="{FF2B5EF4-FFF2-40B4-BE49-F238E27FC236}">
+                <a16:creationId xmlns:a16="http://schemas.microsoft.com/office/drawing/2014/main" id="{0F6477CF-9910-4379-A822-F29CD87E3555}"/>
+              </a:ext>
+            </a:extLst>
+          </p:cNvPr>
           <p:cNvSpPr>
             <a:spLocks noGrp="1"/>
           </p:cNvSpPr>
@@ -4382,14 +4428,20 @@
           <a:p>
             <a:r>
               <a:rPr lang="en-US" dirty="0"/>
-              <a:t>Reproducible analysis &amp; reporting</a:t>
-            </a:r>
-          </a:p>
-        </p:txBody>
-      </p:sp>
-      <p:sp>
-        <p:nvSpPr>
-          <p:cNvPr id="3" name="Slide Number Placeholder 2"/>
+              <a:t>Your psy6136 project</a:t>
+            </a:r>
+          </a:p>
+        </p:txBody>
+      </p:sp>
+      <p:sp>
+        <p:nvSpPr>
+          <p:cNvPr id="4" name="Slide Number Placeholder 3">
+            <a:extLst>
+              <a:ext uri="{FF2B5EF4-FFF2-40B4-BE49-F238E27FC236}">
+                <a16:creationId xmlns:a16="http://schemas.microsoft.com/office/drawing/2014/main" id="{D708DC88-FF62-41FB-9996-47DF32C946E1}"/>
+              </a:ext>
+            </a:extLst>
+          </p:cNvPr>
           <p:cNvSpPr>
             <a:spLocks noGrp="1"/>
           </p:cNvSpPr>
@@ -4402,7 +4454,7 @@
           <a:bodyPr/>
           <a:lstStyle/>
           <a:p>
-            <a:fld id="{20401A5A-FA6E-4462-B8C5-A4D4B3FA6BB1}" type="slidenum">
+            <a:fld id="{621225AB-15B9-4C79-A121-04D1DC7E2307}" type="slidenum">
               <a:rPr lang="en-US" smtClean="0"/>
               <a:t>11</a:t>
             </a:fld>
@@ -4410,9 +4462,56 @@
           </a:p>
         </p:txBody>
       </p:sp>
+      <p:sp>
+        <p:nvSpPr>
+          <p:cNvPr id="5" name="TextBox 4">
+            <a:extLst>
+              <a:ext uri="{FF2B5EF4-FFF2-40B4-BE49-F238E27FC236}">
+                <a16:creationId xmlns:a16="http://schemas.microsoft.com/office/drawing/2014/main" id="{A1929DA5-86B1-4BB7-AF4C-13D4BC8C469C}"/>
+              </a:ext>
+            </a:extLst>
+          </p:cNvPr>
+          <p:cNvSpPr txBox="1"/>
+          <p:nvPr/>
+        </p:nvSpPr>
+        <p:spPr>
+          <a:xfrm>
+            <a:off x="457200" y="1219200"/>
+            <a:ext cx="8229600" cy="646331"/>
+          </a:xfrm>
+          <a:prstGeom prst="rect">
+            <a:avLst/>
+          </a:prstGeom>
+          <a:noFill/>
+        </p:spPr>
+        <p:txBody>
+          <a:bodyPr wrap="square" rtlCol="0">
+            <a:spAutoFit/>
+          </a:bodyPr>
+          <a:lstStyle/>
+          <a:p>
+            <a:r>
+              <a:rPr lang="en-US" dirty="0"/>
+              <a:t>I recommend that you create your own RStudio project for work in this course</a:t>
+            </a:r>
+          </a:p>
+          <a:p>
+            <a:r>
+              <a:rPr lang="en-US" dirty="0"/>
+              <a:t>This will enable you to keep all your work together, in a structured way</a:t>
+            </a:r>
+          </a:p>
+        </p:txBody>
+      </p:sp>
       <p:pic>
         <p:nvPicPr>
-          <p:cNvPr id="4" name="Picture 3"/>
+          <p:cNvPr id="7" name="Picture 6" descr="Graphical user interface, text, application&#10;&#10;Description automatically generated">
+            <a:extLst>
+              <a:ext uri="{FF2B5EF4-FFF2-40B4-BE49-F238E27FC236}">
+                <a16:creationId xmlns:a16="http://schemas.microsoft.com/office/drawing/2014/main" id="{3D8EE110-AD12-4758-92EC-7634B78F6931}"/>
+              </a:ext>
+            </a:extLst>
+          </p:cNvPr>
           <p:cNvPicPr>
             <a:picLocks noChangeAspect="1"/>
           </p:cNvPicPr>
@@ -4432,146 +4531,137 @@
         </p:blipFill>
         <p:spPr>
           <a:xfrm>
-            <a:off x="381000" y="1447800"/>
-            <a:ext cx="4476191" cy="3714286"/>
+            <a:off x="533401" y="2182965"/>
+            <a:ext cx="3505200" cy="2541435"/>
           </a:xfrm>
           <a:prstGeom prst="rect">
             <a:avLst/>
           </a:prstGeom>
         </p:spPr>
       </p:pic>
-      <p:sp>
-        <p:nvSpPr>
-          <p:cNvPr id="5" name="TextBox 4"/>
-          <p:cNvSpPr txBox="1"/>
-          <p:nvPr/>
-        </p:nvSpPr>
-        <p:spPr>
-          <a:xfrm>
-            <a:off x="5334000" y="1447800"/>
-            <a:ext cx="3352800" cy="3693319"/>
-          </a:xfrm>
-          <a:prstGeom prst="rect">
-            <a:avLst/>
-          </a:prstGeom>
-          <a:noFill/>
-        </p:spPr>
-        <p:txBody>
-          <a:bodyPr wrap="square" rtlCol="0">
-            <a:spAutoFit/>
-          </a:bodyPr>
-          <a:lstStyle/>
-          <a:p>
-            <a:r>
-              <a:rPr lang="en-US" dirty="0"/>
-              <a:t>R Studio, together with the </a:t>
-            </a:r>
-            <a:r>
-              <a:rPr lang="en-US" dirty="0" err="1"/>
-              <a:t>knitr</a:t>
-            </a:r>
-            <a:r>
-              <a:rPr lang="en-US" dirty="0"/>
-              <a:t> and </a:t>
-            </a:r>
-            <a:r>
-              <a:rPr lang="en-US" dirty="0" err="1"/>
-              <a:t>rmarkdown</a:t>
-            </a:r>
-            <a:r>
-              <a:rPr lang="en-US" dirty="0"/>
-              <a:t> packages provide an easy way to combine writing, analysis, and R output into complete documents</a:t>
-            </a:r>
-          </a:p>
-          <a:p>
-            <a:endParaRPr lang="en-US" dirty="0"/>
-          </a:p>
-          <a:p>
-            <a:r>
-              <a:rPr lang="en-US" dirty="0"/>
-              <a:t>.</a:t>
-            </a:r>
-            <a:r>
-              <a:rPr lang="en-US" dirty="0" err="1"/>
-              <a:t>Rmd</a:t>
-            </a:r>
-            <a:r>
-              <a:rPr lang="en-US" dirty="0"/>
-              <a:t> files are just text files, using </a:t>
-            </a:r>
-            <a:r>
-              <a:rPr lang="en-US" dirty="0" err="1"/>
-              <a:t>rmarkdown</a:t>
-            </a:r>
-            <a:r>
-              <a:rPr lang="en-US" dirty="0"/>
-              <a:t> markup and </a:t>
-            </a:r>
-            <a:r>
-              <a:rPr lang="en-US" dirty="0" err="1"/>
-              <a:t>knitr</a:t>
-            </a:r>
-            <a:r>
-              <a:rPr lang="en-US" dirty="0"/>
-              <a:t> to run R on “code chunks”</a:t>
-            </a:r>
-          </a:p>
-          <a:p>
-            <a:endParaRPr lang="en-US" dirty="0"/>
-          </a:p>
-          <a:p>
-            <a:r>
-              <a:rPr lang="en-US" dirty="0"/>
-              <a:t>A given document can be rendered in different output formats: </a:t>
-            </a:r>
-          </a:p>
-        </p:txBody>
-      </p:sp>
       <p:pic>
         <p:nvPicPr>
-          <p:cNvPr id="2050" name="Picture 2" descr="C:\Dropbox\Documents\SCS\RGraphics\images\rmarkdown-knit.png"/>
+          <p:cNvPr id="11" name="Picture 10" descr="Graphical user interface, text, application, email&#10;&#10;Description automatically generated">
+            <a:extLst>
+              <a:ext uri="{FF2B5EF4-FFF2-40B4-BE49-F238E27FC236}">
+                <a16:creationId xmlns:a16="http://schemas.microsoft.com/office/drawing/2014/main" id="{C8E37255-1B47-4C4E-9146-0BF8D1A29A70}"/>
+              </a:ext>
+            </a:extLst>
+          </p:cNvPr>
           <p:cNvPicPr>
-            <a:picLocks noChangeAspect="1" noChangeArrowheads="1"/>
+            <a:picLocks noChangeAspect="1"/>
           </p:cNvPicPr>
           <p:nvPr/>
         </p:nvPicPr>
         <p:blipFill>
-          <a:blip r:embed="rId3" cstate="print">
+          <a:blip r:embed="rId3">
             <a:extLst>
               <a:ext uri="{28A0092B-C50C-407E-A947-70E740481C1C}">
                 <a14:useLocalDpi xmlns:a14="http://schemas.microsoft.com/office/drawing/2010/main" val="0"/>
               </a:ext>
             </a:extLst>
           </a:blip>
-          <a:srcRect/>
           <a:stretch>
             <a:fillRect/>
           </a:stretch>
         </p:blipFill>
-        <p:spPr bwMode="auto">
-          <a:xfrm>
-            <a:off x="6049328" y="5162086"/>
-            <a:ext cx="1308167" cy="971600"/>
+        <p:spPr>
+          <a:xfrm>
+            <a:off x="4500881" y="3399651"/>
+            <a:ext cx="4104638" cy="2946133"/>
+          </a:xfrm>
+          <a:prstGeom prst="rect">
+            <a:avLst/>
+          </a:prstGeom>
+        </p:spPr>
+      </p:pic>
+      <p:cxnSp>
+        <p:nvCxnSpPr>
+          <p:cNvPr id="13" name="Straight Arrow Connector 12">
+            <a:extLst>
+              <a:ext uri="{FF2B5EF4-FFF2-40B4-BE49-F238E27FC236}">
+                <a16:creationId xmlns:a16="http://schemas.microsoft.com/office/drawing/2014/main" id="{FD5BEDE0-56B9-40C9-A489-837AC46D1228}"/>
+              </a:ext>
+            </a:extLst>
+          </p:cNvPr>
+          <p:cNvCxnSpPr/>
+          <p:nvPr/>
+        </p:nvCxnSpPr>
+        <p:spPr>
+          <a:xfrm>
+            <a:off x="3352800" y="3048000"/>
+            <a:ext cx="1371600" cy="990600"/>
+          </a:xfrm>
+          <a:prstGeom prst="straightConnector1">
+            <a:avLst/>
+          </a:prstGeom>
+          <a:ln w="31750">
+            <a:solidFill>
+              <a:srgbClr val="FF0000"/>
+            </a:solidFill>
+            <a:tailEnd type="stealth" w="lg" len="lg"/>
+          </a:ln>
+        </p:spPr>
+        <p:style>
+          <a:lnRef idx="1">
+            <a:schemeClr val="accent1"/>
+          </a:lnRef>
+          <a:fillRef idx="0">
+            <a:schemeClr val="accent1"/>
+          </a:fillRef>
+          <a:effectRef idx="0">
+            <a:schemeClr val="accent1"/>
+          </a:effectRef>
+          <a:fontRef idx="minor">
+            <a:schemeClr val="tx1"/>
+          </a:fontRef>
+        </p:style>
+      </p:cxnSp>
+      <p:sp>
+        <p:nvSpPr>
+          <p:cNvPr id="15" name="TextBox 14">
+            <a:extLst>
+              <a:ext uri="{FF2B5EF4-FFF2-40B4-BE49-F238E27FC236}">
+                <a16:creationId xmlns:a16="http://schemas.microsoft.com/office/drawing/2014/main" id="{895CFF46-6E93-47F2-81B3-63E004B3FAB6}"/>
+              </a:ext>
+            </a:extLst>
+          </p:cNvPr>
+          <p:cNvSpPr txBox="1"/>
+          <p:nvPr/>
+        </p:nvSpPr>
+        <p:spPr>
+          <a:xfrm>
+            <a:off x="4587240" y="2188125"/>
+            <a:ext cx="3581399" cy="830997"/>
           </a:xfrm>
           <a:prstGeom prst="rect">
             <a:avLst/>
           </a:prstGeom>
           <a:noFill/>
-          <a:extLst>
-            <a:ext uri="{909E8E84-426E-40DD-AFC4-6F175D3DCCD1}">
-              <a14:hiddenFill xmlns:a14="http://schemas.microsoft.com/office/drawing/2010/main">
-                <a:solidFill>
-                  <a:srgbClr val="FFFFFF"/>
-                </a:solidFill>
-              </a14:hiddenFill>
-            </a:ext>
-          </a:extLst>
-        </p:spPr>
-      </p:pic>
+        </p:spPr>
+        <p:txBody>
+          <a:bodyPr wrap="square" rtlCol="0">
+            <a:spAutoFit/>
+          </a:bodyPr>
+          <a:lstStyle/>
+          <a:p>
+            <a:r>
+              <a:rPr lang="en-US" sz="1600" dirty="0"/>
+              <a:t>This will create a file, my6136.Rproj</a:t>
+            </a:r>
+          </a:p>
+          <a:p>
+            <a:r>
+              <a:rPr lang="en-US" sz="1600" dirty="0"/>
+              <a:t>Double-click on this to launch it in RStudio</a:t>
+            </a:r>
+          </a:p>
+        </p:txBody>
+      </p:sp>
     </p:spTree>
     <p:extLst>
       <p:ext uri="{BB962C8B-B14F-4D97-AF65-F5344CB8AC3E}">
-        <p14:creationId xmlns:p14="http://schemas.microsoft.com/office/powerpoint/2010/main" val="3878256074"/>
+        <p14:creationId xmlns:p14="http://schemas.microsoft.com/office/powerpoint/2010/main" val="1681638328"/>
       </p:ext>
     </p:extLst>
   </p:cSld>
@@ -4600,7 +4690,13 @@
       </p:grpSpPr>
       <p:sp>
         <p:nvSpPr>
-          <p:cNvPr id="2" name="Title 1"/>
+          <p:cNvPr id="2" name="Title 1">
+            <a:extLst>
+              <a:ext uri="{FF2B5EF4-FFF2-40B4-BE49-F238E27FC236}">
+                <a16:creationId xmlns:a16="http://schemas.microsoft.com/office/drawing/2014/main" id="{9DF1A2D4-2C69-43D8-A77B-B6E8ADF47D54}"/>
+              </a:ext>
+            </a:extLst>
+          </p:cNvPr>
           <p:cNvSpPr>
             <a:spLocks noGrp="1"/>
           </p:cNvSpPr>
@@ -4617,14 +4713,20 @@
           <a:p>
             <a:r>
               <a:rPr lang="en-US" dirty="0"/>
-              <a:t>Output formats and templates</a:t>
-            </a:r>
-          </a:p>
-        </p:txBody>
-      </p:sp>
-      <p:sp>
-        <p:nvSpPr>
-          <p:cNvPr id="3" name="Slide Number Placeholder 2"/>
+              <a:t>Your psy6136 project</a:t>
+            </a:r>
+          </a:p>
+        </p:txBody>
+      </p:sp>
+      <p:sp>
+        <p:nvSpPr>
+          <p:cNvPr id="3" name="Slide Number Placeholder 2">
+            <a:extLst>
+              <a:ext uri="{FF2B5EF4-FFF2-40B4-BE49-F238E27FC236}">
+                <a16:creationId xmlns:a16="http://schemas.microsoft.com/office/drawing/2014/main" id="{929E94CE-FABE-4D0E-83B5-EC6BB7E5C29B}"/>
+              </a:ext>
+            </a:extLst>
+          </p:cNvPr>
           <p:cNvSpPr>
             <a:spLocks noGrp="1"/>
           </p:cNvSpPr>
@@ -4637,7 +4739,7 @@
           <a:bodyPr/>
           <a:lstStyle/>
           <a:p>
-            <a:fld id="{20401A5A-FA6E-4462-B8C5-A4D4B3FA6BB1}" type="slidenum">
+            <a:fld id="{621225AB-15B9-4C79-A121-04D1DC7E2307}" type="slidenum">
               <a:rPr lang="en-US" smtClean="0"/>
               <a:t>12</a:t>
             </a:fld>
@@ -4645,9 +4747,71 @@
           </a:p>
         </p:txBody>
       </p:sp>
+      <p:sp>
+        <p:nvSpPr>
+          <p:cNvPr id="4" name="TextBox 3">
+            <a:extLst>
+              <a:ext uri="{FF2B5EF4-FFF2-40B4-BE49-F238E27FC236}">
+                <a16:creationId xmlns:a16="http://schemas.microsoft.com/office/drawing/2014/main" id="{A083634A-A49C-4BC3-AF1F-1555C218640F}"/>
+              </a:ext>
+            </a:extLst>
+          </p:cNvPr>
+          <p:cNvSpPr txBox="1"/>
+          <p:nvPr/>
+        </p:nvSpPr>
+        <p:spPr>
+          <a:xfrm>
+            <a:off x="457200" y="1219200"/>
+            <a:ext cx="8229600" cy="1200329"/>
+          </a:xfrm>
+          <a:prstGeom prst="rect">
+            <a:avLst/>
+          </a:prstGeom>
+          <a:noFill/>
+        </p:spPr>
+        <p:txBody>
+          <a:bodyPr wrap="square" rtlCol="0">
+            <a:spAutoFit/>
+          </a:bodyPr>
+          <a:lstStyle/>
+          <a:p>
+            <a:r>
+              <a:rPr lang="en-US" dirty="0"/>
+              <a:t>I also recommend that you create </a:t>
+            </a:r>
+            <a:r>
+              <a:rPr lang="en-US" dirty="0">
+                <a:solidFill>
+                  <a:srgbClr val="0070C0"/>
+                </a:solidFill>
+              </a:rPr>
+              <a:t>sub-folders</a:t>
+            </a:r>
+            <a:r>
+              <a:rPr lang="en-US" dirty="0"/>
+              <a:t> there to organize your work</a:t>
+            </a:r>
+          </a:p>
+          <a:p>
+            <a:endParaRPr lang="en-US" dirty="0"/>
+          </a:p>
+          <a:p>
+            <a:r>
+              <a:rPr lang="en-US" dirty="0"/>
+              <a:t>What you name them is up to you, but the main thing is for you to keep things organized by topics.</a:t>
+            </a:r>
+          </a:p>
+        </p:txBody>
+      </p:sp>
       <p:pic>
         <p:nvPicPr>
-          <p:cNvPr id="4" name="Picture 3"/>
+          <p:cNvPr id="6" name="Picture 5" descr="Graphical user interface&#10;&#10;Description automatically generated">
+            <a:extLst>
+              <a:ext uri="{FF2B5EF4-FFF2-40B4-BE49-F238E27FC236}">
+                <a16:creationId xmlns:a16="http://schemas.microsoft.com/office/drawing/2014/main" id="{A854C474-82CB-4028-9CC7-08FBC3191C4C}"/>
+              </a:ext>
+            </a:extLst>
+          </p:cNvPr>
           <p:cNvPicPr>
             <a:picLocks noChangeAspect="1"/>
           </p:cNvPicPr>
@@ -4667,8 +4831,8 @@
         </p:blipFill>
         <p:spPr>
           <a:xfrm>
-            <a:off x="524408" y="1600200"/>
-            <a:ext cx="4029075" cy="4057650"/>
+            <a:off x="601298" y="2758205"/>
+            <a:ext cx="7443257" cy="1737595"/>
           </a:xfrm>
           <a:prstGeom prst="rect">
             <a:avLst/>
@@ -4677,14 +4841,20 @@
       </p:pic>
       <p:sp>
         <p:nvSpPr>
-          <p:cNvPr id="5" name="TextBox 4"/>
+          <p:cNvPr id="7" name="TextBox 6">
+            <a:extLst>
+              <a:ext uri="{FF2B5EF4-FFF2-40B4-BE49-F238E27FC236}">
+                <a16:creationId xmlns:a16="http://schemas.microsoft.com/office/drawing/2014/main" id="{DCDD99AF-84E2-405A-BA6A-50F8A7A8F4B5}"/>
+              </a:ext>
+            </a:extLst>
+          </p:cNvPr>
           <p:cNvSpPr txBox="1"/>
           <p:nvPr/>
         </p:nvSpPr>
         <p:spPr>
           <a:xfrm>
-            <a:off x="4953000" y="1447800"/>
-            <a:ext cx="3733800" cy="923330"/>
+            <a:off x="1890963" y="4834476"/>
+            <a:ext cx="1447800" cy="738664"/>
           </a:xfrm>
           <a:prstGeom prst="rect">
             <a:avLst/>
@@ -4698,84 +4868,33 @@
           <a:lstStyle/>
           <a:p>
             <a:r>
-              <a:rPr lang="en-US" dirty="0"/>
-              <a:t>The integration of R, R Studio, </a:t>
-            </a:r>
-            <a:r>
-              <a:rPr lang="en-US" dirty="0" err="1"/>
-              <a:t>knitr</a:t>
-            </a:r>
-            <a:r>
-              <a:rPr lang="en-US" dirty="0"/>
-              <a:t>, </a:t>
-            </a:r>
-            <a:r>
-              <a:rPr lang="en-US" dirty="0" err="1"/>
-              <a:t>rmarkdown</a:t>
-            </a:r>
-            <a:r>
-              <a:rPr lang="en-US" dirty="0"/>
-              <a:t> and other tools is now highly advanced.</a:t>
-            </a:r>
-          </a:p>
-        </p:txBody>
-      </p:sp>
-      <p:pic>
-        <p:nvPicPr>
-          <p:cNvPr id="3074" name="Picture 2" descr="C:\Dropbox\Documents\DDAR\images\ddar-cover.png"/>
-          <p:cNvPicPr>
-            <a:picLocks noChangeAspect="1" noChangeArrowheads="1"/>
-          </p:cNvPicPr>
-          <p:nvPr/>
-        </p:nvPicPr>
-        <p:blipFill>
-          <a:blip r:embed="rId3" cstate="print">
+              <a:rPr lang="en-US" sz="1400" dirty="0"/>
+              <a:t>R scripts, data, outputs for assignments</a:t>
+            </a:r>
+          </a:p>
+        </p:txBody>
+      </p:sp>
+      <p:sp>
+        <p:nvSpPr>
+          <p:cNvPr id="8" name="TextBox 7">
             <a:extLst>
-              <a:ext uri="{28A0092B-C50C-407E-A947-70E740481C1C}">
-                <a14:useLocalDpi xmlns:a14="http://schemas.microsoft.com/office/drawing/2010/main" val="0"/>
+              <a:ext uri="{FF2B5EF4-FFF2-40B4-BE49-F238E27FC236}">
+                <a16:creationId xmlns:a16="http://schemas.microsoft.com/office/drawing/2014/main" id="{D215343C-55CC-4A88-8FC3-9FC07ED12B4D}"/>
               </a:ext>
             </a:extLst>
-          </a:blip>
-          <a:srcRect/>
-          <a:stretch>
-            <a:fillRect/>
-          </a:stretch>
-        </p:blipFill>
-        <p:spPr bwMode="auto">
-          <a:xfrm>
-            <a:off x="5029202" y="2667268"/>
-            <a:ext cx="783334" cy="1209524"/>
+          </p:cNvPr>
+          <p:cNvSpPr txBox="1"/>
+          <p:nvPr/>
+        </p:nvSpPr>
+        <p:spPr>
+          <a:xfrm>
+            <a:off x="5988117" y="4687411"/>
+            <a:ext cx="1295400" cy="738664"/>
           </a:xfrm>
           <a:prstGeom prst="rect">
             <a:avLst/>
           </a:prstGeom>
           <a:noFill/>
-          <a:extLst>
-            <a:ext uri="{909E8E84-426E-40DD-AFC4-6F175D3DCCD1}">
-              <a14:hiddenFill xmlns:a14="http://schemas.microsoft.com/office/drawing/2010/main">
-                <a:solidFill>
-                  <a:srgbClr val="FFFFFF"/>
-                </a:solidFill>
-              </a14:hiddenFill>
-            </a:ext>
-          </a:extLst>
-        </p:spPr>
-      </p:pic>
-      <p:sp>
-        <p:nvSpPr>
-          <p:cNvPr id="6" name="TextBox 5"/>
-          <p:cNvSpPr txBox="1"/>
-          <p:nvPr/>
-        </p:nvSpPr>
-        <p:spPr>
-          <a:xfrm>
-            <a:off x="6069650" y="2717602"/>
-            <a:ext cx="2540950" cy="954107"/>
-          </a:xfrm>
-          <a:prstGeom prst="rect">
-            <a:avLst/>
-          </a:prstGeom>
-          <a:noFill/>
         </p:spPr>
         <p:txBody>
           <a:bodyPr wrap="square" rtlCol="0">
@@ -4785,231 +4904,7 @@
           <a:p>
             <a:r>
               <a:rPr lang="en-US" sz="1400" dirty="0"/>
-              <a:t>My last book was written entirely in R Studio, using .</a:t>
-            </a:r>
-            <a:r>
-              <a:rPr lang="en-US" sz="1400" dirty="0" err="1"/>
-              <a:t>Rnw</a:t>
-            </a:r>
-            <a:r>
-              <a:rPr lang="en-US" sz="1400" dirty="0"/>
-              <a:t> syntax </a:t>
-            </a:r>
-            <a:r>
-              <a:rPr lang="en-US" sz="1400" dirty="0">
-                <a:latin typeface="Arial"/>
-                <a:cs typeface="Arial"/>
-              </a:rPr>
-              <a:t>→</a:t>
-            </a:r>
-            <a:r>
-              <a:rPr lang="en-US" sz="1400" dirty="0">
-                <a:cs typeface="Arial"/>
-              </a:rPr>
-              <a:t> </a:t>
-            </a:r>
-            <a:r>
-              <a:rPr lang="en-US" sz="1400" dirty="0" err="1">
-                <a:cs typeface="Arial"/>
-              </a:rPr>
-              <a:t>LaTeX</a:t>
-            </a:r>
-            <a:r>
-              <a:rPr lang="en-US" sz="1400" dirty="0">
-                <a:cs typeface="Arial"/>
-              </a:rPr>
-              <a:t> </a:t>
-            </a:r>
-            <a:r>
-              <a:rPr lang="en-US" sz="1400" dirty="0"/>
-              <a:t> </a:t>
-            </a:r>
-            <a:r>
-              <a:rPr lang="en-US" sz="1400" dirty="0">
-                <a:latin typeface="Arial"/>
-                <a:cs typeface="Arial"/>
-              </a:rPr>
-              <a:t>→</a:t>
-            </a:r>
-            <a:r>
-              <a:rPr lang="en-US" sz="1400" dirty="0">
-                <a:cs typeface="Arial"/>
-              </a:rPr>
-              <a:t>  PDF </a:t>
-            </a:r>
-            <a:r>
-              <a:rPr lang="en-US" sz="1400" dirty="0"/>
-              <a:t> </a:t>
-            </a:r>
-            <a:r>
-              <a:rPr lang="en-US" sz="1400" dirty="0">
-                <a:latin typeface="Arial"/>
-                <a:cs typeface="Arial"/>
-              </a:rPr>
-              <a:t>→</a:t>
-            </a:r>
-            <a:r>
-              <a:rPr lang="en-US" sz="1400" dirty="0">
-                <a:cs typeface="Arial"/>
-              </a:rPr>
-              <a:t>  camera ready copy</a:t>
-            </a:r>
-            <a:endParaRPr lang="en-US" sz="1400" dirty="0"/>
-          </a:p>
-        </p:txBody>
-      </p:sp>
-      <p:pic>
-        <p:nvPicPr>
-          <p:cNvPr id="7" name="Picture 6"/>
-          <p:cNvPicPr>
-            <a:picLocks noChangeAspect="1"/>
-          </p:cNvPicPr>
-          <p:nvPr/>
-        </p:nvPicPr>
-        <p:blipFill>
-          <a:blip r:embed="rId4" cstate="print">
-            <a:extLst>
-              <a:ext uri="{28A0092B-C50C-407E-A947-70E740481C1C}">
-                <a14:useLocalDpi xmlns:a14="http://schemas.microsoft.com/office/drawing/2010/main" val="0"/>
-              </a:ext>
-            </a:extLst>
-          </a:blip>
-          <a:stretch>
-            <a:fillRect/>
-          </a:stretch>
-        </p:blipFill>
-        <p:spPr>
-          <a:xfrm>
-            <a:off x="5029202" y="4267200"/>
-            <a:ext cx="798576" cy="1219200"/>
-          </a:xfrm>
-          <a:prstGeom prst="rect">
-            <a:avLst/>
-          </a:prstGeom>
-        </p:spPr>
-      </p:pic>
-      <p:sp>
-        <p:nvSpPr>
-          <p:cNvPr id="8" name="TextBox 7"/>
-          <p:cNvSpPr txBox="1"/>
-          <p:nvPr/>
-        </p:nvSpPr>
-        <p:spPr>
-          <a:xfrm>
-            <a:off x="6172200" y="4149754"/>
-            <a:ext cx="2514600" cy="1815882"/>
-          </a:xfrm>
-          <a:prstGeom prst="rect">
-            <a:avLst/>
-          </a:prstGeom>
-          <a:noFill/>
-        </p:spPr>
-        <p:txBody>
-          <a:bodyPr wrap="square" rtlCol="0">
-            <a:spAutoFit/>
-          </a:bodyPr>
-          <a:lstStyle/>
-          <a:p>
-            <a:r>
-              <a:rPr lang="en-US" sz="1400" dirty="0"/>
-              <a:t>The ggplot2 book was written using .</a:t>
-            </a:r>
-            <a:r>
-              <a:rPr lang="en-US" sz="1400" dirty="0" err="1"/>
-              <a:t>Rmd</a:t>
-            </a:r>
-            <a:r>
-              <a:rPr lang="en-US" sz="1400" dirty="0"/>
-              <a:t> format. </a:t>
-            </a:r>
-          </a:p>
-          <a:p>
-            <a:r>
-              <a:rPr lang="en-US" sz="1400" dirty="0"/>
-              <a:t> </a:t>
-            </a:r>
-          </a:p>
-          <a:p>
-            <a:r>
-              <a:rPr lang="en-US" sz="1400" dirty="0"/>
-              <a:t>The </a:t>
-            </a:r>
-            <a:r>
-              <a:rPr lang="en-US" sz="1400" dirty="0" err="1">
-                <a:solidFill>
-                  <a:srgbClr val="0070C0"/>
-                </a:solidFill>
-              </a:rPr>
-              <a:t>bookdown</a:t>
-            </a:r>
-            <a:r>
-              <a:rPr lang="en-US" sz="1400" dirty="0"/>
-              <a:t> package makes it easier to manage a book-length project – TOC, fig/table #s, cross-references, etc.</a:t>
-            </a:r>
-          </a:p>
-          <a:p>
-            <a:r>
-              <a:rPr lang="en-US" sz="1400" dirty="0"/>
-              <a:t>Also: </a:t>
-            </a:r>
-            <a:r>
-              <a:rPr lang="en-US" sz="1400" dirty="0" err="1">
-                <a:solidFill>
-                  <a:schemeClr val="tx2">
-                    <a:lumMod val="60000"/>
-                    <a:lumOff val="40000"/>
-                  </a:schemeClr>
-                </a:solidFill>
-              </a:rPr>
-              <a:t>blogdown</a:t>
-            </a:r>
-            <a:r>
-              <a:rPr lang="en-US" sz="1400" dirty="0"/>
-              <a:t>, </a:t>
-            </a:r>
-            <a:r>
-              <a:rPr lang="en-US" sz="1400" dirty="0" err="1">
-                <a:solidFill>
-                  <a:schemeClr val="tx2">
-                    <a:lumMod val="60000"/>
-                    <a:lumOff val="40000"/>
-                  </a:schemeClr>
-                </a:solidFill>
-              </a:rPr>
-              <a:t>posterdown</a:t>
-            </a:r>
-            <a:r>
-              <a:rPr lang="en-US" sz="1400" dirty="0"/>
-              <a:t>, …</a:t>
-            </a:r>
-          </a:p>
-        </p:txBody>
-      </p:sp>
-      <p:sp>
-        <p:nvSpPr>
-          <p:cNvPr id="9" name="TextBox 8"/>
-          <p:cNvSpPr txBox="1"/>
-          <p:nvPr/>
-        </p:nvSpPr>
-        <p:spPr>
-          <a:xfrm>
-            <a:off x="609600" y="5867638"/>
-            <a:ext cx="4267200" cy="646331"/>
-          </a:xfrm>
-          <a:prstGeom prst="rect">
-            <a:avLst/>
-          </a:prstGeom>
-          <a:noFill/>
-        </p:spPr>
-        <p:txBody>
-          <a:bodyPr wrap="square" rtlCol="0">
-            <a:spAutoFit/>
-          </a:bodyPr>
-          <a:lstStyle/>
-          <a:p>
-            <a:r>
-              <a:rPr lang="en-US" dirty="0"/>
-              <a:t>Templates are available for APA papers, slides, handouts, entire web sites, etc.</a:t>
+              <a:t>work on tutorials, R examples</a:t>
             </a:r>
           </a:p>
         </p:txBody>
@@ -5017,7 +4912,7 @@
     </p:spTree>
     <p:extLst>
       <p:ext uri="{BB962C8B-B14F-4D97-AF65-F5344CB8AC3E}">
-        <p14:creationId xmlns:p14="http://schemas.microsoft.com/office/powerpoint/2010/main" val="3714688481"/>
+        <p14:creationId xmlns:p14="http://schemas.microsoft.com/office/powerpoint/2010/main" val="47320521"/>
       </p:ext>
     </p:extLst>
   </p:cSld>
@@ -5063,6 +4958,687 @@
           <a:p>
             <a:r>
               <a:rPr lang="en-US" dirty="0"/>
+              <a:t>Reproducible analysis &amp; reporting</a:t>
+            </a:r>
+          </a:p>
+        </p:txBody>
+      </p:sp>
+      <p:sp>
+        <p:nvSpPr>
+          <p:cNvPr id="3" name="Slide Number Placeholder 2"/>
+          <p:cNvSpPr>
+            <a:spLocks noGrp="1"/>
+          </p:cNvSpPr>
+          <p:nvPr>
+            <p:ph type="sldNum" sz="quarter" idx="12"/>
+          </p:nvPr>
+        </p:nvSpPr>
+        <p:spPr/>
+        <p:txBody>
+          <a:bodyPr/>
+          <a:lstStyle/>
+          <a:p>
+            <a:fld id="{20401A5A-FA6E-4462-B8C5-A4D4B3FA6BB1}" type="slidenum">
+              <a:rPr lang="en-US" smtClean="0"/>
+              <a:t>13</a:t>
+            </a:fld>
+            <a:endParaRPr lang="en-US"/>
+          </a:p>
+        </p:txBody>
+      </p:sp>
+      <p:pic>
+        <p:nvPicPr>
+          <p:cNvPr id="4" name="Picture 3"/>
+          <p:cNvPicPr>
+            <a:picLocks noChangeAspect="1"/>
+          </p:cNvPicPr>
+          <p:nvPr/>
+        </p:nvPicPr>
+        <p:blipFill>
+          <a:blip r:embed="rId2">
+            <a:extLst>
+              <a:ext uri="{28A0092B-C50C-407E-A947-70E740481C1C}">
+                <a14:useLocalDpi xmlns:a14="http://schemas.microsoft.com/office/drawing/2010/main" val="0"/>
+              </a:ext>
+            </a:extLst>
+          </a:blip>
+          <a:stretch>
+            <a:fillRect/>
+          </a:stretch>
+        </p:blipFill>
+        <p:spPr>
+          <a:xfrm>
+            <a:off x="381000" y="1447800"/>
+            <a:ext cx="4476191" cy="3714286"/>
+          </a:xfrm>
+          <a:prstGeom prst="rect">
+            <a:avLst/>
+          </a:prstGeom>
+        </p:spPr>
+      </p:pic>
+      <p:sp>
+        <p:nvSpPr>
+          <p:cNvPr id="5" name="TextBox 4"/>
+          <p:cNvSpPr txBox="1"/>
+          <p:nvPr/>
+        </p:nvSpPr>
+        <p:spPr>
+          <a:xfrm>
+            <a:off x="5334000" y="1447800"/>
+            <a:ext cx="3352800" cy="3693319"/>
+          </a:xfrm>
+          <a:prstGeom prst="rect">
+            <a:avLst/>
+          </a:prstGeom>
+          <a:noFill/>
+        </p:spPr>
+        <p:txBody>
+          <a:bodyPr wrap="square" rtlCol="0">
+            <a:spAutoFit/>
+          </a:bodyPr>
+          <a:lstStyle/>
+          <a:p>
+            <a:r>
+              <a:rPr lang="en-US" dirty="0"/>
+              <a:t>R Studio, together with the </a:t>
+            </a:r>
+            <a:r>
+              <a:rPr lang="en-US" dirty="0" err="1"/>
+              <a:t>knitr</a:t>
+            </a:r>
+            <a:r>
+              <a:rPr lang="en-US" dirty="0"/>
+              <a:t> and </a:t>
+            </a:r>
+            <a:r>
+              <a:rPr lang="en-US" dirty="0" err="1"/>
+              <a:t>rmarkdown</a:t>
+            </a:r>
+            <a:r>
+              <a:rPr lang="en-US" dirty="0"/>
+              <a:t> packages provide an easy way to combine writing, analysis, and R output into complete documents</a:t>
+            </a:r>
+          </a:p>
+          <a:p>
+            <a:endParaRPr lang="en-US" dirty="0"/>
+          </a:p>
+          <a:p>
+            <a:r>
+              <a:rPr lang="en-US" dirty="0"/>
+              <a:t>.</a:t>
+            </a:r>
+            <a:r>
+              <a:rPr lang="en-US" dirty="0" err="1"/>
+              <a:t>Rmd</a:t>
+            </a:r>
+            <a:r>
+              <a:rPr lang="en-US" dirty="0"/>
+              <a:t> files are just text files, using </a:t>
+            </a:r>
+            <a:r>
+              <a:rPr lang="en-US" dirty="0" err="1"/>
+              <a:t>rmarkdown</a:t>
+            </a:r>
+            <a:r>
+              <a:rPr lang="en-US" dirty="0"/>
+              <a:t> markup and </a:t>
+            </a:r>
+            <a:r>
+              <a:rPr lang="en-US" dirty="0" err="1"/>
+              <a:t>knitr</a:t>
+            </a:r>
+            <a:r>
+              <a:rPr lang="en-US" dirty="0"/>
+              <a:t> to run R on “code chunks”</a:t>
+            </a:r>
+          </a:p>
+          <a:p>
+            <a:endParaRPr lang="en-US" dirty="0"/>
+          </a:p>
+          <a:p>
+            <a:r>
+              <a:rPr lang="en-US" dirty="0"/>
+              <a:t>A given document can be rendered in different output formats: </a:t>
+            </a:r>
+          </a:p>
+        </p:txBody>
+      </p:sp>
+      <p:pic>
+        <p:nvPicPr>
+          <p:cNvPr id="2050" name="Picture 2" descr="C:\Dropbox\Documents\SCS\RGraphics\images\rmarkdown-knit.png"/>
+          <p:cNvPicPr>
+            <a:picLocks noChangeAspect="1" noChangeArrowheads="1"/>
+          </p:cNvPicPr>
+          <p:nvPr/>
+        </p:nvPicPr>
+        <p:blipFill>
+          <a:blip r:embed="rId3" cstate="print">
+            <a:extLst>
+              <a:ext uri="{28A0092B-C50C-407E-A947-70E740481C1C}">
+                <a14:useLocalDpi xmlns:a14="http://schemas.microsoft.com/office/drawing/2010/main" val="0"/>
+              </a:ext>
+            </a:extLst>
+          </a:blip>
+          <a:srcRect/>
+          <a:stretch>
+            <a:fillRect/>
+          </a:stretch>
+        </p:blipFill>
+        <p:spPr bwMode="auto">
+          <a:xfrm>
+            <a:off x="6049328" y="5162086"/>
+            <a:ext cx="1308167" cy="971600"/>
+          </a:xfrm>
+          <a:prstGeom prst="rect">
+            <a:avLst/>
+          </a:prstGeom>
+          <a:noFill/>
+          <a:extLst>
+            <a:ext uri="{909E8E84-426E-40DD-AFC4-6F175D3DCCD1}">
+              <a14:hiddenFill xmlns:a14="http://schemas.microsoft.com/office/drawing/2010/main">
+                <a:solidFill>
+                  <a:srgbClr val="FFFFFF"/>
+                </a:solidFill>
+              </a14:hiddenFill>
+            </a:ext>
+          </a:extLst>
+        </p:spPr>
+      </p:pic>
+    </p:spTree>
+    <p:extLst>
+      <p:ext uri="{BB962C8B-B14F-4D97-AF65-F5344CB8AC3E}">
+        <p14:creationId xmlns:p14="http://schemas.microsoft.com/office/powerpoint/2010/main" val="3878256074"/>
+      </p:ext>
+    </p:extLst>
+  </p:cSld>
+  <p:clrMapOvr>
+    <a:masterClrMapping/>
+  </p:clrMapOvr>
+</p:sld>
+</file>
+
+<file path=ppt/slides/slide14.xml><?xml version="1.0" encoding="utf-8"?>
+<p:sld xmlns:a="http://schemas.openxmlformats.org/drawingml/2006/main" xmlns:r="http://schemas.openxmlformats.org/officeDocument/2006/relationships" xmlns:p="http://schemas.openxmlformats.org/presentationml/2006/main">
+  <p:cSld>
+    <p:spTree>
+      <p:nvGrpSpPr>
+        <p:cNvPr id="1" name=""/>
+        <p:cNvGrpSpPr/>
+        <p:nvPr/>
+      </p:nvGrpSpPr>
+      <p:grpSpPr>
+        <a:xfrm>
+          <a:off x="0" y="0"/>
+          <a:ext cx="0" cy="0"/>
+          <a:chOff x="0" y="0"/>
+          <a:chExt cx="0" cy="0"/>
+        </a:xfrm>
+      </p:grpSpPr>
+      <p:sp>
+        <p:nvSpPr>
+          <p:cNvPr id="2" name="Title 1"/>
+          <p:cNvSpPr>
+            <a:spLocks noGrp="1"/>
+          </p:cNvSpPr>
+          <p:nvPr>
+            <p:ph type="title"/>
+          </p:nvPr>
+        </p:nvSpPr>
+        <p:spPr/>
+        <p:txBody>
+          <a:bodyPr>
+            <a:normAutofit fontScale="90000"/>
+          </a:bodyPr>
+          <a:lstStyle/>
+          <a:p>
+            <a:r>
+              <a:rPr lang="en-US" dirty="0"/>
+              <a:t>Output formats and templates</a:t>
+            </a:r>
+          </a:p>
+        </p:txBody>
+      </p:sp>
+      <p:sp>
+        <p:nvSpPr>
+          <p:cNvPr id="3" name="Slide Number Placeholder 2"/>
+          <p:cNvSpPr>
+            <a:spLocks noGrp="1"/>
+          </p:cNvSpPr>
+          <p:nvPr>
+            <p:ph type="sldNum" sz="quarter" idx="12"/>
+          </p:nvPr>
+        </p:nvSpPr>
+        <p:spPr/>
+        <p:txBody>
+          <a:bodyPr/>
+          <a:lstStyle/>
+          <a:p>
+            <a:fld id="{20401A5A-FA6E-4462-B8C5-A4D4B3FA6BB1}" type="slidenum">
+              <a:rPr lang="en-US" smtClean="0"/>
+              <a:t>14</a:t>
+            </a:fld>
+            <a:endParaRPr lang="en-US"/>
+          </a:p>
+        </p:txBody>
+      </p:sp>
+      <p:pic>
+        <p:nvPicPr>
+          <p:cNvPr id="4" name="Picture 3"/>
+          <p:cNvPicPr>
+            <a:picLocks noChangeAspect="1"/>
+          </p:cNvPicPr>
+          <p:nvPr/>
+        </p:nvPicPr>
+        <p:blipFill>
+          <a:blip r:embed="rId2">
+            <a:extLst>
+              <a:ext uri="{28A0092B-C50C-407E-A947-70E740481C1C}">
+                <a14:useLocalDpi xmlns:a14="http://schemas.microsoft.com/office/drawing/2010/main" val="0"/>
+              </a:ext>
+            </a:extLst>
+          </a:blip>
+          <a:stretch>
+            <a:fillRect/>
+          </a:stretch>
+        </p:blipFill>
+        <p:spPr>
+          <a:xfrm>
+            <a:off x="524408" y="1600200"/>
+            <a:ext cx="4029075" cy="4057650"/>
+          </a:xfrm>
+          <a:prstGeom prst="rect">
+            <a:avLst/>
+          </a:prstGeom>
+        </p:spPr>
+      </p:pic>
+      <p:sp>
+        <p:nvSpPr>
+          <p:cNvPr id="5" name="TextBox 4"/>
+          <p:cNvSpPr txBox="1"/>
+          <p:nvPr/>
+        </p:nvSpPr>
+        <p:spPr>
+          <a:xfrm>
+            <a:off x="4953000" y="1447800"/>
+            <a:ext cx="3733800" cy="923330"/>
+          </a:xfrm>
+          <a:prstGeom prst="rect">
+            <a:avLst/>
+          </a:prstGeom>
+          <a:noFill/>
+        </p:spPr>
+        <p:txBody>
+          <a:bodyPr wrap="square" rtlCol="0">
+            <a:spAutoFit/>
+          </a:bodyPr>
+          <a:lstStyle/>
+          <a:p>
+            <a:r>
+              <a:rPr lang="en-US" dirty="0"/>
+              <a:t>The integration of R, R Studio, </a:t>
+            </a:r>
+            <a:r>
+              <a:rPr lang="en-US" dirty="0" err="1"/>
+              <a:t>knitr</a:t>
+            </a:r>
+            <a:r>
+              <a:rPr lang="en-US" dirty="0"/>
+              <a:t>, </a:t>
+            </a:r>
+            <a:r>
+              <a:rPr lang="en-US" dirty="0" err="1"/>
+              <a:t>rmarkdown</a:t>
+            </a:r>
+            <a:r>
+              <a:rPr lang="en-US" dirty="0"/>
+              <a:t> and other tools is now highly advanced.</a:t>
+            </a:r>
+          </a:p>
+        </p:txBody>
+      </p:sp>
+      <p:pic>
+        <p:nvPicPr>
+          <p:cNvPr id="3074" name="Picture 2" descr="C:\Dropbox\Documents\DDAR\images\ddar-cover.png"/>
+          <p:cNvPicPr>
+            <a:picLocks noChangeAspect="1" noChangeArrowheads="1"/>
+          </p:cNvPicPr>
+          <p:nvPr/>
+        </p:nvPicPr>
+        <p:blipFill>
+          <a:blip r:embed="rId3" cstate="print">
+            <a:extLst>
+              <a:ext uri="{28A0092B-C50C-407E-A947-70E740481C1C}">
+                <a14:useLocalDpi xmlns:a14="http://schemas.microsoft.com/office/drawing/2010/main" val="0"/>
+              </a:ext>
+            </a:extLst>
+          </a:blip>
+          <a:srcRect/>
+          <a:stretch>
+            <a:fillRect/>
+          </a:stretch>
+        </p:blipFill>
+        <p:spPr bwMode="auto">
+          <a:xfrm>
+            <a:off x="5029202" y="2667268"/>
+            <a:ext cx="783334" cy="1209524"/>
+          </a:xfrm>
+          <a:prstGeom prst="rect">
+            <a:avLst/>
+          </a:prstGeom>
+          <a:noFill/>
+          <a:extLst>
+            <a:ext uri="{909E8E84-426E-40DD-AFC4-6F175D3DCCD1}">
+              <a14:hiddenFill xmlns:a14="http://schemas.microsoft.com/office/drawing/2010/main">
+                <a:solidFill>
+                  <a:srgbClr val="FFFFFF"/>
+                </a:solidFill>
+              </a14:hiddenFill>
+            </a:ext>
+          </a:extLst>
+        </p:spPr>
+      </p:pic>
+      <p:sp>
+        <p:nvSpPr>
+          <p:cNvPr id="6" name="TextBox 5"/>
+          <p:cNvSpPr txBox="1"/>
+          <p:nvPr/>
+        </p:nvSpPr>
+        <p:spPr>
+          <a:xfrm>
+            <a:off x="6069650" y="2717602"/>
+            <a:ext cx="2540950" cy="954107"/>
+          </a:xfrm>
+          <a:prstGeom prst="rect">
+            <a:avLst/>
+          </a:prstGeom>
+          <a:noFill/>
+        </p:spPr>
+        <p:txBody>
+          <a:bodyPr wrap="square" rtlCol="0">
+            <a:spAutoFit/>
+          </a:bodyPr>
+          <a:lstStyle/>
+          <a:p>
+            <a:r>
+              <a:rPr lang="en-US" sz="1400" dirty="0"/>
+              <a:t>My last book was written entirely in R Studio, using .</a:t>
+            </a:r>
+            <a:r>
+              <a:rPr lang="en-US" sz="1400" dirty="0" err="1"/>
+              <a:t>Rnw</a:t>
+            </a:r>
+            <a:r>
+              <a:rPr lang="en-US" sz="1400" dirty="0"/>
+              <a:t> syntax </a:t>
+            </a:r>
+            <a:r>
+              <a:rPr lang="en-US" sz="1400" dirty="0">
+                <a:latin typeface="Arial"/>
+                <a:cs typeface="Arial"/>
+              </a:rPr>
+              <a:t>→</a:t>
+            </a:r>
+            <a:r>
+              <a:rPr lang="en-US" sz="1400" dirty="0">
+                <a:cs typeface="Arial"/>
+              </a:rPr>
+              <a:t> </a:t>
+            </a:r>
+            <a:r>
+              <a:rPr lang="en-US" sz="1400" dirty="0" err="1">
+                <a:cs typeface="Arial"/>
+              </a:rPr>
+              <a:t>LaTeX</a:t>
+            </a:r>
+            <a:r>
+              <a:rPr lang="en-US" sz="1400" dirty="0">
+                <a:cs typeface="Arial"/>
+              </a:rPr>
+              <a:t> </a:t>
+            </a:r>
+            <a:r>
+              <a:rPr lang="en-US" sz="1400" dirty="0"/>
+              <a:t> </a:t>
+            </a:r>
+            <a:r>
+              <a:rPr lang="en-US" sz="1400" dirty="0">
+                <a:latin typeface="Arial"/>
+                <a:cs typeface="Arial"/>
+              </a:rPr>
+              <a:t>→</a:t>
+            </a:r>
+            <a:r>
+              <a:rPr lang="en-US" sz="1400" dirty="0">
+                <a:cs typeface="Arial"/>
+              </a:rPr>
+              <a:t>  PDF </a:t>
+            </a:r>
+            <a:r>
+              <a:rPr lang="en-US" sz="1400" dirty="0"/>
+              <a:t> </a:t>
+            </a:r>
+            <a:r>
+              <a:rPr lang="en-US" sz="1400" dirty="0">
+                <a:latin typeface="Arial"/>
+                <a:cs typeface="Arial"/>
+              </a:rPr>
+              <a:t>→</a:t>
+            </a:r>
+            <a:r>
+              <a:rPr lang="en-US" sz="1400" dirty="0">
+                <a:cs typeface="Arial"/>
+              </a:rPr>
+              <a:t>  camera ready copy</a:t>
+            </a:r>
+            <a:endParaRPr lang="en-US" sz="1400" dirty="0"/>
+          </a:p>
+        </p:txBody>
+      </p:sp>
+      <p:pic>
+        <p:nvPicPr>
+          <p:cNvPr id="7" name="Picture 6"/>
+          <p:cNvPicPr>
+            <a:picLocks noChangeAspect="1"/>
+          </p:cNvPicPr>
+          <p:nvPr/>
+        </p:nvPicPr>
+        <p:blipFill>
+          <a:blip r:embed="rId4" cstate="print">
+            <a:extLst>
+              <a:ext uri="{28A0092B-C50C-407E-A947-70E740481C1C}">
+                <a14:useLocalDpi xmlns:a14="http://schemas.microsoft.com/office/drawing/2010/main" val="0"/>
+              </a:ext>
+            </a:extLst>
+          </a:blip>
+          <a:stretch>
+            <a:fillRect/>
+          </a:stretch>
+        </p:blipFill>
+        <p:spPr>
+          <a:xfrm>
+            <a:off x="5029202" y="4267200"/>
+            <a:ext cx="798576" cy="1219200"/>
+          </a:xfrm>
+          <a:prstGeom prst="rect">
+            <a:avLst/>
+          </a:prstGeom>
+        </p:spPr>
+      </p:pic>
+      <p:sp>
+        <p:nvSpPr>
+          <p:cNvPr id="8" name="TextBox 7"/>
+          <p:cNvSpPr txBox="1"/>
+          <p:nvPr/>
+        </p:nvSpPr>
+        <p:spPr>
+          <a:xfrm>
+            <a:off x="6172200" y="4149754"/>
+            <a:ext cx="2514600" cy="1815882"/>
+          </a:xfrm>
+          <a:prstGeom prst="rect">
+            <a:avLst/>
+          </a:prstGeom>
+          <a:noFill/>
+        </p:spPr>
+        <p:txBody>
+          <a:bodyPr wrap="square" rtlCol="0">
+            <a:spAutoFit/>
+          </a:bodyPr>
+          <a:lstStyle/>
+          <a:p>
+            <a:r>
+              <a:rPr lang="en-US" sz="1400" dirty="0"/>
+              <a:t>The ggplot2 book was written using .</a:t>
+            </a:r>
+            <a:r>
+              <a:rPr lang="en-US" sz="1400" dirty="0" err="1"/>
+              <a:t>Rmd</a:t>
+            </a:r>
+            <a:r>
+              <a:rPr lang="en-US" sz="1400" dirty="0"/>
+              <a:t> format. </a:t>
+            </a:r>
+          </a:p>
+          <a:p>
+            <a:r>
+              <a:rPr lang="en-US" sz="1400" dirty="0"/>
+              <a:t> </a:t>
+            </a:r>
+          </a:p>
+          <a:p>
+            <a:r>
+              <a:rPr lang="en-US" sz="1400" dirty="0"/>
+              <a:t>The </a:t>
+            </a:r>
+            <a:r>
+              <a:rPr lang="en-US" sz="1400" dirty="0" err="1">
+                <a:solidFill>
+                  <a:srgbClr val="0070C0"/>
+                </a:solidFill>
+              </a:rPr>
+              <a:t>bookdown</a:t>
+            </a:r>
+            <a:r>
+              <a:rPr lang="en-US" sz="1400" dirty="0"/>
+              <a:t> package makes it easier to manage a book-length project – TOC, fig/table #s, cross-references, etc.</a:t>
+            </a:r>
+          </a:p>
+          <a:p>
+            <a:r>
+              <a:rPr lang="en-US" sz="1400" dirty="0"/>
+              <a:t>Also: </a:t>
+            </a:r>
+            <a:r>
+              <a:rPr lang="en-US" sz="1400" dirty="0" err="1">
+                <a:solidFill>
+                  <a:schemeClr val="tx2">
+                    <a:lumMod val="60000"/>
+                    <a:lumOff val="40000"/>
+                  </a:schemeClr>
+                </a:solidFill>
+              </a:rPr>
+              <a:t>blogdown</a:t>
+            </a:r>
+            <a:r>
+              <a:rPr lang="en-US" sz="1400" dirty="0"/>
+              <a:t>, </a:t>
+            </a:r>
+            <a:r>
+              <a:rPr lang="en-US" sz="1400" dirty="0" err="1">
+                <a:solidFill>
+                  <a:schemeClr val="tx2">
+                    <a:lumMod val="60000"/>
+                    <a:lumOff val="40000"/>
+                  </a:schemeClr>
+                </a:solidFill>
+              </a:rPr>
+              <a:t>posterdown</a:t>
+            </a:r>
+            <a:r>
+              <a:rPr lang="en-US" sz="1400" dirty="0"/>
+              <a:t>, …</a:t>
+            </a:r>
+          </a:p>
+        </p:txBody>
+      </p:sp>
+      <p:sp>
+        <p:nvSpPr>
+          <p:cNvPr id="9" name="TextBox 8"/>
+          <p:cNvSpPr txBox="1"/>
+          <p:nvPr/>
+        </p:nvSpPr>
+        <p:spPr>
+          <a:xfrm>
+            <a:off x="609600" y="5867638"/>
+            <a:ext cx="4267200" cy="646331"/>
+          </a:xfrm>
+          <a:prstGeom prst="rect">
+            <a:avLst/>
+          </a:prstGeom>
+          <a:noFill/>
+        </p:spPr>
+        <p:txBody>
+          <a:bodyPr wrap="square" rtlCol="0">
+            <a:spAutoFit/>
+          </a:bodyPr>
+          <a:lstStyle/>
+          <a:p>
+            <a:r>
+              <a:rPr lang="en-US" dirty="0"/>
+              <a:t>Templates are available for APA papers, slides, handouts, entire web sites, etc.</a:t>
+            </a:r>
+          </a:p>
+        </p:txBody>
+      </p:sp>
+    </p:spTree>
+    <p:extLst>
+      <p:ext uri="{BB962C8B-B14F-4D97-AF65-F5344CB8AC3E}">
+        <p14:creationId xmlns:p14="http://schemas.microsoft.com/office/powerpoint/2010/main" val="3714688481"/>
+      </p:ext>
+    </p:extLst>
+  </p:cSld>
+  <p:clrMapOvr>
+    <a:masterClrMapping/>
+  </p:clrMapOvr>
+</p:sld>
+</file>
+
+<file path=ppt/slides/slide15.xml><?xml version="1.0" encoding="utf-8"?>
+<p:sld xmlns:a="http://schemas.openxmlformats.org/drawingml/2006/main" xmlns:r="http://schemas.openxmlformats.org/officeDocument/2006/relationships" xmlns:p="http://schemas.openxmlformats.org/presentationml/2006/main">
+  <p:cSld>
+    <p:spTree>
+      <p:nvGrpSpPr>
+        <p:cNvPr id="1" name=""/>
+        <p:cNvGrpSpPr/>
+        <p:nvPr/>
+      </p:nvGrpSpPr>
+      <p:grpSpPr>
+        <a:xfrm>
+          <a:off x="0" y="0"/>
+          <a:ext cx="0" cy="0"/>
+          <a:chOff x="0" y="0"/>
+          <a:chExt cx="0" cy="0"/>
+        </a:xfrm>
+      </p:grpSpPr>
+      <p:sp>
+        <p:nvSpPr>
+          <p:cNvPr id="2" name="Title 1"/>
+          <p:cNvSpPr>
+            <a:spLocks noGrp="1"/>
+          </p:cNvSpPr>
+          <p:nvPr>
+            <p:ph type="title"/>
+          </p:nvPr>
+        </p:nvSpPr>
+        <p:spPr/>
+        <p:txBody>
+          <a:bodyPr>
+            <a:normAutofit fontScale="90000"/>
+          </a:bodyPr>
+          <a:lstStyle/>
+          <a:p>
+            <a:r>
+              <a:rPr lang="en-US" dirty="0"/>
               <a:t>Writing it up</a:t>
             </a:r>
           </a:p>
@@ -5092,15 +5668,35 @@
           <a:p>
             <a:r>
               <a:rPr lang="en-US" dirty="0"/>
-              <a:t>In R Studio, create a .</a:t>
-            </a:r>
-            <a:r>
-              <a:rPr lang="en-US" dirty="0" err="1"/>
+              <a:t>In R Studio, create a </a:t>
+            </a:r>
+            <a:r>
+              <a:rPr lang="en-US" dirty="0">
+                <a:solidFill>
+                  <a:srgbClr val="0070C0"/>
+                </a:solidFill>
+              </a:rPr>
+              <a:t>.</a:t>
+            </a:r>
+            <a:r>
+              <a:rPr lang="en-US" dirty="0" err="1">
+                <a:solidFill>
+                  <a:srgbClr val="0070C0"/>
+                </a:solidFill>
+              </a:rPr>
               <a:t>Rmd</a:t>
             </a:r>
             <a:r>
+              <a:rPr lang="en-US" dirty="0">
+                <a:solidFill>
+                  <a:srgbClr val="0070C0"/>
+                </a:solidFill>
+              </a:rPr>
+              <a:t> </a:t>
+            </a:r>
+            <a:r>
               <a:rPr lang="en-US" dirty="0"/>
-              <a:t> file to use R Markdown for your write-up</a:t>
+              <a:t>file to use R Markdown for your write-up</a:t>
             </a:r>
           </a:p>
           <a:p>
@@ -5140,7 +5736,7 @@
           <a:p>
             <a:fld id="{621225AB-15B9-4C79-A121-04D1DC7E2307}" type="slidenum">
               <a:rPr lang="en-US" smtClean="0"/>
-              <a:t>13</a:t>
+              <a:t>15</a:t>
             </a:fld>
             <a:endParaRPr lang="en-US"/>
           </a:p>
@@ -5307,7 +5903,7 @@
 </p:sld>
 </file>
 
-<file path=ppt/slides/slide14.xml><?xml version="1.0" encoding="utf-8"?>
+<file path=ppt/slides/slide16.xml><?xml version="1.0" encoding="utf-8"?>
 <p:sld xmlns:a="http://schemas.openxmlformats.org/drawingml/2006/main" xmlns:r="http://schemas.openxmlformats.org/officeDocument/2006/relationships" xmlns:p="http://schemas.openxmlformats.org/presentationml/2006/main">
   <p:cSld>
     <p:spTree>
@@ -5376,7 +5972,19 @@
           <a:p>
             <a:r>
               <a:rPr lang="en-US" dirty="0"/>
-              <a:t>Include code chunks for analysis &amp; graphs</a:t>
+              <a:t>Include </a:t>
+            </a:r>
+            <a:r>
+              <a:rPr lang="en-US" dirty="0">
+                <a:solidFill>
+                  <a:srgbClr val="0070C0"/>
+                </a:solidFill>
+              </a:rPr>
+              <a:t>code chunks </a:t>
+            </a:r>
+            <a:r>
+              <a:rPr lang="en-US" dirty="0"/>
+              <a:t>for analysis &amp; graphs</a:t>
             </a:r>
           </a:p>
         </p:txBody>
@@ -5398,7 +6006,7 @@
           <a:p>
             <a:fld id="{621225AB-15B9-4C79-A121-04D1DC7E2307}" type="slidenum">
               <a:rPr lang="en-US" smtClean="0"/>
-              <a:t>14</a:t>
+              <a:t>16</a:t>
             </a:fld>
             <a:endParaRPr lang="en-US" dirty="0"/>
           </a:p>
@@ -5682,7 +6290,7 @@
 </p:sld>
 </file>
 
-<file path=ppt/slides/slide15.xml><?xml version="1.0" encoding="utf-8"?>
+<file path=ppt/slides/slide17.xml><?xml version="1.0" encoding="utf-8"?>
 <p:sld xmlns:a="http://schemas.openxmlformats.org/drawingml/2006/main" xmlns:r="http://schemas.openxmlformats.org/officeDocument/2006/relationships" xmlns:p="http://schemas.openxmlformats.org/presentationml/2006/main">
   <p:cSld>
     <p:spTree>
@@ -5744,7 +6352,7 @@
           <a:p>
             <a:fld id="{20401A5A-FA6E-4462-B8C5-A4D4B3FA6BB1}" type="slidenum">
               <a:rPr lang="en-US" smtClean="0"/>
-              <a:t>15</a:t>
+              <a:t>17</a:t>
             </a:fld>
             <a:endParaRPr lang="en-US"/>
           </a:p>
@@ -5895,6 +6503,50 @@
           <a:xfrm>
             <a:off x="3200400" y="5334000"/>
             <a:ext cx="990600" cy="0"/>
+          </a:xfrm>
+          <a:prstGeom prst="straightConnector1">
+            <a:avLst/>
+          </a:prstGeom>
+          <a:ln w="22225">
+            <a:solidFill>
+              <a:srgbClr val="FF0000"/>
+            </a:solidFill>
+            <a:tailEnd type="arrow"/>
+          </a:ln>
+        </p:spPr>
+        <p:style>
+          <a:lnRef idx="1">
+            <a:schemeClr val="accent1"/>
+          </a:lnRef>
+          <a:fillRef idx="0">
+            <a:schemeClr val="accent1"/>
+          </a:fillRef>
+          <a:effectRef idx="0">
+            <a:schemeClr val="accent1"/>
+          </a:effectRef>
+          <a:fontRef idx="minor">
+            <a:schemeClr val="tx1"/>
+          </a:fontRef>
+        </p:style>
+      </p:cxnSp>
+      <p:cxnSp>
+        <p:nvCxnSpPr>
+          <p:cNvPr id="9" name="Straight Arrow Connector 8">
+            <a:extLst>
+              <a:ext uri="{FF2B5EF4-FFF2-40B4-BE49-F238E27FC236}">
+                <a16:creationId xmlns:a16="http://schemas.microsoft.com/office/drawing/2014/main" id="{20E44A51-0A01-46CF-A449-0A7C89BDBAD5}"/>
+              </a:ext>
+            </a:extLst>
+          </p:cNvPr>
+          <p:cNvCxnSpPr>
+            <a:cxnSpLocks/>
+          </p:cNvCxnSpPr>
+          <p:nvPr/>
+        </p:nvCxnSpPr>
+        <p:spPr>
+          <a:xfrm>
+            <a:off x="2590800" y="4800600"/>
+            <a:ext cx="1676400" cy="0"/>
           </a:xfrm>
           <a:prstGeom prst="straightConnector1">
             <a:avLst/>
@@ -5934,7 +6586,7 @@
 </p:sld>
 </file>
 
-<file path=ppt/slides/slide16.xml><?xml version="1.0" encoding="utf-8"?>
+<file path=ppt/slides/slide18.xml><?xml version="1.0" encoding="utf-8"?>
 <p:sld xmlns:a="http://schemas.openxmlformats.org/drawingml/2006/main" xmlns:r="http://schemas.openxmlformats.org/officeDocument/2006/relationships" xmlns:p="http://schemas.openxmlformats.org/presentationml/2006/main">
   <p:cSld>
     <p:spTree>
@@ -5992,7 +6644,7 @@
           <a:p>
             <a:fld id="{20401A5A-FA6E-4462-B8C5-A4D4B3FA6BB1}" type="slidenum">
               <a:rPr lang="en-US" smtClean="0"/>
-              <a:t>16</a:t>
+              <a:t>18</a:t>
             </a:fld>
             <a:endParaRPr lang="en-US"/>
           </a:p>
@@ -6322,7 +6974,7 @@
 </p:sld>
 </file>
 
-<file path=ppt/slides/slide17.xml><?xml version="1.0" encoding="utf-8"?>
+<file path=ppt/slides/slide19.xml><?xml version="1.0" encoding="utf-8"?>
 <p:sld xmlns:a="http://schemas.openxmlformats.org/drawingml/2006/main" xmlns:r="http://schemas.openxmlformats.org/officeDocument/2006/relationships" xmlns:p="http://schemas.openxmlformats.org/presentationml/2006/main">
   <p:cSld>
     <p:spTree>
@@ -6356,7 +7008,7 @@
           <a:p>
             <a:fld id="{20401A5A-FA6E-4462-B8C5-A4D4B3FA6BB1}" type="slidenum">
               <a:rPr lang="en-US" smtClean="0"/>
-              <a:t>17</a:t>
+              <a:t>19</a:t>
             </a:fld>
             <a:endParaRPr lang="en-US"/>
           </a:p>
@@ -6457,7 +7109,7 @@
 </p:sld>
 </file>
 
-<file path=ppt/slides/slide18.xml><?xml version="1.0" encoding="utf-8"?>
+<file path=ppt/slides/slide2.xml><?xml version="1.0" encoding="utf-8"?>
 <p:sld xmlns:a="http://schemas.openxmlformats.org/drawingml/2006/main" xmlns:r="http://schemas.openxmlformats.org/officeDocument/2006/relationships" xmlns:p="http://schemas.openxmlformats.org/presentationml/2006/main">
   <p:cSld>
     <p:spTree>
@@ -6476,6 +7128,356 @@
       </p:grpSpPr>
       <p:sp>
         <p:nvSpPr>
+          <p:cNvPr id="2" name="Title 1"/>
+          <p:cNvSpPr>
+            <a:spLocks noGrp="1"/>
+          </p:cNvSpPr>
+          <p:nvPr>
+            <p:ph type="title"/>
+          </p:nvPr>
+        </p:nvSpPr>
+        <p:spPr/>
+        <p:txBody>
+          <a:bodyPr>
+            <a:normAutofit fontScale="90000"/>
+          </a:bodyPr>
+          <a:lstStyle/>
+          <a:p>
+            <a:r>
+              <a:rPr lang="en-US" dirty="0"/>
+              <a:t>Getting started: Tools</a:t>
+            </a:r>
+          </a:p>
+        </p:txBody>
+      </p:sp>
+      <p:sp>
+        <p:nvSpPr>
+          <p:cNvPr id="3" name="Content Placeholder 2"/>
+          <p:cNvSpPr>
+            <a:spLocks noGrp="1"/>
+          </p:cNvSpPr>
+          <p:nvPr>
+            <p:ph idx="1"/>
+          </p:nvPr>
+        </p:nvSpPr>
+        <p:spPr>
+          <a:xfrm>
+            <a:off x="457200" y="1143000"/>
+            <a:ext cx="8229600" cy="5105400"/>
+          </a:xfrm>
+        </p:spPr>
+        <p:txBody>
+          <a:bodyPr>
+            <a:normAutofit/>
+          </a:bodyPr>
+          <a:lstStyle/>
+          <a:p>
+            <a:r>
+              <a:rPr lang="en-US" sz="2800" dirty="0"/>
+              <a:t>To profit best, you need to install both R and R Studio on your computer</a:t>
+            </a:r>
+          </a:p>
+          <a:p>
+            <a:pPr marL="0" indent="0">
+              <a:buNone/>
+            </a:pPr>
+            <a:endParaRPr lang="en-US" sz="2800" dirty="0"/>
+          </a:p>
+        </p:txBody>
+      </p:sp>
+      <p:sp>
+        <p:nvSpPr>
+          <p:cNvPr id="4" name="Slide Number Placeholder 3"/>
+          <p:cNvSpPr>
+            <a:spLocks noGrp="1"/>
+          </p:cNvSpPr>
+          <p:nvPr>
+            <p:ph type="sldNum" sz="quarter" idx="12"/>
+          </p:nvPr>
+        </p:nvSpPr>
+        <p:spPr/>
+        <p:txBody>
+          <a:bodyPr/>
+          <a:lstStyle/>
+          <a:p>
+            <a:endParaRPr lang="en-US" dirty="0"/>
+          </a:p>
+        </p:txBody>
+      </p:sp>
+      <p:pic>
+        <p:nvPicPr>
+          <p:cNvPr id="6" name="Picture 5"/>
+          <p:cNvPicPr>
+            <a:picLocks noChangeAspect="1" noChangeArrowheads="1"/>
+          </p:cNvPicPr>
+          <p:nvPr/>
+        </p:nvPicPr>
+        <p:blipFill>
+          <a:blip r:embed="rId2">
+            <a:extLst>
+              <a:ext uri="{28A0092B-C50C-407E-A947-70E740481C1C}">
+                <a14:useLocalDpi xmlns:a14="http://schemas.microsoft.com/office/drawing/2010/main" val="0"/>
+              </a:ext>
+            </a:extLst>
+          </a:blip>
+          <a:srcRect/>
+          <a:stretch>
+            <a:fillRect/>
+          </a:stretch>
+        </p:blipFill>
+        <p:spPr bwMode="auto">
+          <a:xfrm>
+            <a:off x="1179409" y="4292600"/>
+            <a:ext cx="1508760" cy="1508760"/>
+          </a:xfrm>
+          <a:prstGeom prst="rect">
+            <a:avLst/>
+          </a:prstGeom>
+          <a:noFill/>
+          <a:extLst>
+            <a:ext uri="{909E8E84-426E-40DD-AFC4-6F175D3DCCD1}">
+              <a14:hiddenFill xmlns:a14="http://schemas.microsoft.com/office/drawing/2010/main">
+                <a:solidFill>
+                  <a:srgbClr val="FFFFFF"/>
+                </a:solidFill>
+              </a14:hiddenFill>
+            </a:ext>
+          </a:extLst>
+        </p:spPr>
+      </p:pic>
+      <p:sp>
+        <p:nvSpPr>
+          <p:cNvPr id="7" name="TextBox 6"/>
+          <p:cNvSpPr txBox="1"/>
+          <p:nvPr/>
+        </p:nvSpPr>
+        <p:spPr>
+          <a:xfrm>
+            <a:off x="3657600" y="2514600"/>
+            <a:ext cx="4724400" cy="1107996"/>
+          </a:xfrm>
+          <a:prstGeom prst="rect">
+            <a:avLst/>
+          </a:prstGeom>
+          <a:noFill/>
+        </p:spPr>
+        <p:txBody>
+          <a:bodyPr wrap="square" rtlCol="0">
+            <a:spAutoFit/>
+          </a:bodyPr>
+          <a:lstStyle/>
+          <a:p>
+            <a:r>
+              <a:rPr lang="en-US" dirty="0"/>
+              <a:t>The basic R system: R console (GUI) &amp; packages</a:t>
+            </a:r>
+          </a:p>
+          <a:p>
+            <a:r>
+              <a:rPr lang="en-US" dirty="0"/>
+              <a:t>Download: </a:t>
+            </a:r>
+            <a:r>
+              <a:rPr lang="en-US" dirty="0">
+                <a:hlinkClick r:id="rId3"/>
+              </a:rPr>
+              <a:t>http://cran.us.r-project.org/</a:t>
+            </a:r>
+            <a:endParaRPr lang="en-US" dirty="0"/>
+          </a:p>
+          <a:p>
+            <a:r>
+              <a:rPr lang="en-US" b="1" dirty="0"/>
+              <a:t>Add</a:t>
+            </a:r>
+            <a:r>
+              <a:rPr lang="en-US" dirty="0"/>
+              <a:t> my recommended packages: </a:t>
+            </a:r>
+            <a:r>
+              <a:rPr lang="en-US" sz="1200" dirty="0"/>
+              <a:t>source(</a:t>
+            </a:r>
+            <a:r>
+              <a:rPr lang="en-US" sz="1200" dirty="0">
+                <a:hlinkClick r:id="rId4"/>
+              </a:rPr>
+              <a:t>“</a:t>
+            </a:r>
+            <a:r>
+              <a:rPr lang="en-US" sz="1200" dirty="0">
+                <a:hlinkClick r:id="rId5"/>
+              </a:rPr>
+              <a:t>https://friendly.github.io/psy6136//R/install-</a:t>
+            </a:r>
+            <a:r>
+              <a:rPr lang="en-US" sz="1200" dirty="0" err="1">
+                <a:hlinkClick r:id="rId5"/>
+              </a:rPr>
+              <a:t>pkgs.R</a:t>
+            </a:r>
+            <a:r>
+              <a:rPr lang="en-US" sz="1200" dirty="0"/>
+              <a:t> ”)</a:t>
+            </a:r>
+          </a:p>
+        </p:txBody>
+      </p:sp>
+      <p:sp>
+        <p:nvSpPr>
+          <p:cNvPr id="8" name="TextBox 7"/>
+          <p:cNvSpPr txBox="1"/>
+          <p:nvPr/>
+        </p:nvSpPr>
+        <p:spPr>
+          <a:xfrm>
+            <a:off x="3657600" y="4099295"/>
+            <a:ext cx="4724400" cy="1077218"/>
+          </a:xfrm>
+          <a:prstGeom prst="rect">
+            <a:avLst/>
+          </a:prstGeom>
+          <a:noFill/>
+        </p:spPr>
+        <p:txBody>
+          <a:bodyPr wrap="square" rtlCol="0">
+            <a:spAutoFit/>
+          </a:bodyPr>
+          <a:lstStyle/>
+          <a:p>
+            <a:r>
+              <a:rPr lang="en-US" dirty="0"/>
+              <a:t>The R Studio IDE: analyze, write, publish</a:t>
+            </a:r>
+          </a:p>
+          <a:p>
+            <a:r>
+              <a:rPr lang="en-US" dirty="0"/>
+              <a:t>Download: </a:t>
+            </a:r>
+            <a:r>
+              <a:rPr lang="en-US" sz="1400" dirty="0">
+                <a:hlinkClick r:id="rId6"/>
+              </a:rPr>
+              <a:t>https://www.rstudio.com/products/rstudio/download/</a:t>
+            </a:r>
+            <a:endParaRPr lang="en-US" sz="1400" dirty="0"/>
+          </a:p>
+          <a:p>
+            <a:r>
+              <a:rPr lang="en-US" sz="1400" b="1" dirty="0"/>
+              <a:t>Add</a:t>
+            </a:r>
+            <a:r>
+              <a:rPr lang="en-US" sz="1400" dirty="0"/>
+              <a:t>: R Studio-related packages, as useful</a:t>
+            </a:r>
+          </a:p>
+        </p:txBody>
+      </p:sp>
+      <p:pic>
+        <p:nvPicPr>
+          <p:cNvPr id="1026" name="Picture 2" descr="https://www.rstudio.com/wp-content/uploads/2015/06/Rlogonew.png"/>
+          <p:cNvPicPr>
+            <a:picLocks noChangeAspect="1" noChangeArrowheads="1"/>
+          </p:cNvPicPr>
+          <p:nvPr/>
+        </p:nvPicPr>
+        <p:blipFill>
+          <a:blip r:embed="rId7">
+            <a:extLst>
+              <a:ext uri="{28A0092B-C50C-407E-A947-70E740481C1C}">
+                <a14:useLocalDpi xmlns:a14="http://schemas.microsoft.com/office/drawing/2010/main" val="0"/>
+              </a:ext>
+            </a:extLst>
+          </a:blip>
+          <a:srcRect/>
+          <a:stretch>
+            <a:fillRect/>
+          </a:stretch>
+        </p:blipFill>
+        <p:spPr bwMode="auto">
+          <a:xfrm>
+            <a:off x="783169" y="2514600"/>
+            <a:ext cx="1905000" cy="1476375"/>
+          </a:xfrm>
+          <a:prstGeom prst="rect">
+            <a:avLst/>
+          </a:prstGeom>
+          <a:noFill/>
+          <a:extLst>
+            <a:ext uri="{909E8E84-426E-40DD-AFC4-6F175D3DCCD1}">
+              <a14:hiddenFill xmlns:a14="http://schemas.microsoft.com/office/drawing/2010/main">
+                <a:solidFill>
+                  <a:srgbClr val="FFFFFF"/>
+                </a:solidFill>
+              </a14:hiddenFill>
+            </a:ext>
+          </a:extLst>
+        </p:spPr>
+      </p:pic>
+      <p:pic>
+        <p:nvPicPr>
+          <p:cNvPr id="5" name="Picture 4"/>
+          <p:cNvPicPr>
+            <a:picLocks noChangeAspect="1"/>
+          </p:cNvPicPr>
+          <p:nvPr/>
+        </p:nvPicPr>
+        <p:blipFill>
+          <a:blip r:embed="rId8">
+            <a:extLst>
+              <a:ext uri="{28A0092B-C50C-407E-A947-70E740481C1C}">
+                <a14:useLocalDpi xmlns:a14="http://schemas.microsoft.com/office/drawing/2010/main" val="0"/>
+              </a:ext>
+            </a:extLst>
+          </a:blip>
+          <a:stretch>
+            <a:fillRect/>
+          </a:stretch>
+        </p:blipFill>
+        <p:spPr>
+          <a:xfrm>
+            <a:off x="3810000" y="5257800"/>
+            <a:ext cx="1376363" cy="1157288"/>
+          </a:xfrm>
+          <a:prstGeom prst="rect">
+            <a:avLst/>
+          </a:prstGeom>
+        </p:spPr>
+      </p:pic>
+    </p:spTree>
+    <p:extLst>
+      <p:ext uri="{BB962C8B-B14F-4D97-AF65-F5344CB8AC3E}">
+        <p14:creationId xmlns:p14="http://schemas.microsoft.com/office/powerpoint/2010/main" val="589838839"/>
+      </p:ext>
+    </p:extLst>
+  </p:cSld>
+  <p:clrMapOvr>
+    <a:masterClrMapping/>
+  </p:clrMapOvr>
+</p:sld>
+</file>
+
+<file path=ppt/slides/slide20.xml><?xml version="1.0" encoding="utf-8"?>
+<p:sld xmlns:a="http://schemas.openxmlformats.org/drawingml/2006/main" xmlns:r="http://schemas.openxmlformats.org/officeDocument/2006/relationships" xmlns:p="http://schemas.openxmlformats.org/presentationml/2006/main">
+  <p:cSld>
+    <p:spTree>
+      <p:nvGrpSpPr>
+        <p:cNvPr id="1" name=""/>
+        <p:cNvGrpSpPr/>
+        <p:nvPr/>
+      </p:nvGrpSpPr>
+      <p:grpSpPr>
+        <a:xfrm>
+          <a:off x="0" y="0"/>
+          <a:ext cx="0" cy="0"/>
+          <a:chOff x="0" y="0"/>
+          <a:chExt cx="0" cy="0"/>
+        </a:xfrm>
+      </p:grpSpPr>
+      <p:sp>
+        <p:nvSpPr>
           <p:cNvPr id="3" name="Title 2"/>
           <p:cNvSpPr>
             <a:spLocks noGrp="1"/>
@@ -6515,7 +7517,7 @@
           <a:p>
             <a:fld id="{20401A5A-FA6E-4462-B8C5-A4D4B3FA6BB1}" type="slidenum">
               <a:rPr lang="en-US" smtClean="0"/>
-              <a:t>18</a:t>
+              <a:t>20</a:t>
             </a:fld>
             <a:endParaRPr lang="en-US"/>
           </a:p>
@@ -6907,8 +7909,8 @@
 </p:sld>
 </file>
 
-<file path=ppt/slides/slide2.xml><?xml version="1.0" encoding="utf-8"?>
-<p:sld xmlns:a="http://schemas.openxmlformats.org/drawingml/2006/main" xmlns:r="http://schemas.openxmlformats.org/officeDocument/2006/relationships" xmlns:p="http://schemas.openxmlformats.org/presentationml/2006/main">
+<file path=ppt/slides/slide21.xml><?xml version="1.0" encoding="utf-8"?>
+<p:sld xmlns:a="http://schemas.openxmlformats.org/drawingml/2006/main" xmlns:r="http://schemas.openxmlformats.org/officeDocument/2006/relationships" xmlns:p="http://schemas.openxmlformats.org/presentationml/2006/main" show="0">
   <p:cSld>
     <p:spTree>
       <p:nvGrpSpPr>
@@ -6926,7 +7928,13 @@
       </p:grpSpPr>
       <p:sp>
         <p:nvSpPr>
-          <p:cNvPr id="2" name="Title 1"/>
+          <p:cNvPr id="2" name="Title 1">
+            <a:extLst>
+              <a:ext uri="{FF2B5EF4-FFF2-40B4-BE49-F238E27FC236}">
+                <a16:creationId xmlns:a16="http://schemas.microsoft.com/office/drawing/2014/main" id="{BA0E1D3C-45EF-40CD-BC84-A5E3298D567A}"/>
+              </a:ext>
+            </a:extLst>
+          </p:cNvPr>
           <p:cNvSpPr>
             <a:spLocks noGrp="1"/>
           </p:cNvSpPr>
@@ -6943,49 +7951,20 @@
           <a:p>
             <a:r>
               <a:rPr lang="en-US" dirty="0"/>
-              <a:t>Getting started: Tools</a:t>
-            </a:r>
-          </a:p>
-        </p:txBody>
-      </p:sp>
-      <p:sp>
-        <p:nvSpPr>
-          <p:cNvPr id="3" name="Content Placeholder 2"/>
-          <p:cNvSpPr>
-            <a:spLocks noGrp="1"/>
-          </p:cNvSpPr>
-          <p:nvPr>
-            <p:ph idx="1"/>
-          </p:nvPr>
-        </p:nvSpPr>
-        <p:spPr>
-          <a:xfrm>
-            <a:off x="457200" y="1143000"/>
-            <a:ext cx="8229600" cy="5105400"/>
-          </a:xfrm>
-        </p:spPr>
-        <p:txBody>
-          <a:bodyPr>
-            <a:normAutofit/>
-          </a:bodyPr>
-          <a:lstStyle/>
-          <a:p>
-            <a:r>
-              <a:rPr lang="en-US" sz="2800" dirty="0"/>
-              <a:t>To profit best, you need to install both R and R Studio on your computer</a:t>
-            </a:r>
-          </a:p>
-          <a:p>
-            <a:pPr marL="0" indent="0">
-              <a:buNone/>
-            </a:pPr>
-            <a:endParaRPr lang="en-US" sz="2800" dirty="0"/>
-          </a:p>
-        </p:txBody>
-      </p:sp>
-      <p:sp>
-        <p:nvSpPr>
-          <p:cNvPr id="4" name="Slide Number Placeholder 3"/>
+              <a:t>R Scripts with markdown</a:t>
+            </a:r>
+          </a:p>
+        </p:txBody>
+      </p:sp>
+      <p:sp>
+        <p:nvSpPr>
+          <p:cNvPr id="3" name="Slide Number Placeholder 2">
+            <a:extLst>
+              <a:ext uri="{FF2B5EF4-FFF2-40B4-BE49-F238E27FC236}">
+                <a16:creationId xmlns:a16="http://schemas.microsoft.com/office/drawing/2014/main" id="{68105351-42A1-46D2-9C37-D4AD170D4710}"/>
+              </a:ext>
+            </a:extLst>
+          </p:cNvPr>
           <p:cNvSpPr>
             <a:spLocks noGrp="1"/>
           </p:cNvSpPr>
@@ -6998,61 +7977,331 @@
           <a:bodyPr/>
           <a:lstStyle/>
           <a:p>
-            <a:endParaRPr lang="en-US" dirty="0"/>
-          </a:p>
-        </p:txBody>
-      </p:sp>
-      <p:pic>
-        <p:nvPicPr>
-          <p:cNvPr id="6" name="Picture 5"/>
-          <p:cNvPicPr>
-            <a:picLocks noChangeAspect="1" noChangeArrowheads="1"/>
-          </p:cNvPicPr>
-          <p:nvPr/>
-        </p:nvPicPr>
-        <p:blipFill>
-          <a:blip r:embed="rId2">
+            <a:fld id="{621225AB-15B9-4C79-A121-04D1DC7E2307}" type="slidenum">
+              <a:rPr lang="en-US" smtClean="0"/>
+              <a:t>21</a:t>
+            </a:fld>
+            <a:endParaRPr lang="en-US"/>
+          </a:p>
+        </p:txBody>
+      </p:sp>
+      <p:sp>
+        <p:nvSpPr>
+          <p:cNvPr id="4" name="TextBox 3">
             <a:extLst>
-              <a:ext uri="{28A0092B-C50C-407E-A947-70E740481C1C}">
-                <a14:useLocalDpi xmlns:a14="http://schemas.microsoft.com/office/drawing/2010/main" val="0"/>
+              <a:ext uri="{FF2B5EF4-FFF2-40B4-BE49-F238E27FC236}">
+                <a16:creationId xmlns:a16="http://schemas.microsoft.com/office/drawing/2014/main" id="{614151A3-BB89-4349-B68F-5C86EFCC5689}"/>
               </a:ext>
             </a:extLst>
-          </a:blip>
-          <a:srcRect/>
-          <a:stretch>
-            <a:fillRect/>
-          </a:stretch>
-        </p:blipFill>
-        <p:spPr bwMode="auto">
-          <a:xfrm>
-            <a:off x="1179409" y="4292600"/>
-            <a:ext cx="1508760" cy="1508760"/>
+          </p:cNvPr>
+          <p:cNvSpPr txBox="1"/>
+          <p:nvPr/>
+        </p:nvSpPr>
+        <p:spPr>
+          <a:xfrm>
+            <a:off x="457200" y="1295400"/>
+            <a:ext cx="4572000" cy="4616648"/>
+          </a:xfrm>
+          <a:prstGeom prst="rect">
+            <a:avLst/>
+          </a:prstGeom>
+          <a:solidFill>
+            <a:schemeClr val="accent6">
+              <a:lumMod val="20000"/>
+              <a:lumOff val="80000"/>
+            </a:schemeClr>
+          </a:solidFill>
+        </p:spPr>
+        <p:txBody>
+          <a:bodyPr wrap="square" rtlCol="0">
+            <a:spAutoFit/>
+          </a:bodyPr>
+          <a:lstStyle/>
+          <a:p>
+            <a:r>
+              <a:rPr lang="en-US" sz="1400" dirty="0"/>
+              <a:t>#' ---</a:t>
+            </a:r>
+          </a:p>
+          <a:p>
+            <a:r>
+              <a:rPr lang="en-US" sz="1400" dirty="0"/>
+              <a:t>#' title: "</a:t>
+            </a:r>
+            <a:r>
+              <a:rPr lang="en-US" sz="1400" dirty="0" err="1"/>
+              <a:t>UCBAdmissions</a:t>
+            </a:r>
+            <a:r>
+              <a:rPr lang="en-US" sz="1400" dirty="0"/>
+              <a:t>: fourfold displays and odds ratios"</a:t>
+            </a:r>
+          </a:p>
+          <a:p>
+            <a:r>
+              <a:rPr lang="en-US" sz="1400" dirty="0"/>
+              <a:t>#' author: "Michael Friendly"</a:t>
+            </a:r>
+          </a:p>
+          <a:p>
+            <a:r>
+              <a:rPr lang="en-US" sz="1400" dirty="0"/>
+              <a:t>#' date: "`r format(</a:t>
+            </a:r>
+            <a:r>
+              <a:rPr lang="en-US" sz="1400" dirty="0" err="1"/>
+              <a:t>Sys.Date</a:t>
+            </a:r>
+            <a:r>
+              <a:rPr lang="en-US" sz="1400" dirty="0"/>
+              <a:t>())`"</a:t>
+            </a:r>
+          </a:p>
+          <a:p>
+            <a:r>
+              <a:rPr lang="en-US" sz="1400" dirty="0"/>
+              <a:t>#' output:</a:t>
+            </a:r>
+          </a:p>
+          <a:p>
+            <a:r>
+              <a:rPr lang="en-US" sz="1400" dirty="0"/>
+              <a:t>#'   </a:t>
+            </a:r>
+            <a:r>
+              <a:rPr lang="en-US" sz="1400" dirty="0" err="1"/>
+              <a:t>html_document</a:t>
+            </a:r>
+            <a:r>
+              <a:rPr lang="en-US" sz="1400" dirty="0"/>
+              <a:t>:</a:t>
+            </a:r>
+          </a:p>
+          <a:p>
+            <a:r>
+              <a:rPr lang="en-US" sz="1400" dirty="0"/>
+              <a:t>#'     theme: readable</a:t>
+            </a:r>
+          </a:p>
+          <a:p>
+            <a:r>
+              <a:rPr lang="en-US" sz="1400" dirty="0"/>
+              <a:t>#'     </a:t>
+            </a:r>
+            <a:r>
+              <a:rPr lang="en-US" sz="1400" dirty="0" err="1"/>
+              <a:t>code_download</a:t>
+            </a:r>
+            <a:r>
+              <a:rPr lang="en-US" sz="1400" dirty="0"/>
+              <a:t>: true</a:t>
+            </a:r>
+          </a:p>
+          <a:p>
+            <a:r>
+              <a:rPr lang="en-US" sz="1400" dirty="0"/>
+              <a:t>#' ---</a:t>
+            </a:r>
+          </a:p>
+          <a:p>
+            <a:endParaRPr lang="en-US" sz="1400" dirty="0"/>
+          </a:p>
+          <a:p>
+            <a:r>
+              <a:rPr lang="en-US" sz="1400" dirty="0"/>
+              <a:t>#' ## Load data</a:t>
+            </a:r>
+          </a:p>
+          <a:p>
+            <a:r>
+              <a:rPr lang="en-US" sz="1400" dirty="0"/>
+              <a:t>library(</a:t>
+            </a:r>
+            <a:r>
+              <a:rPr lang="en-US" sz="1400" dirty="0" err="1"/>
+              <a:t>vcd</a:t>
+            </a:r>
+            <a:r>
+              <a:rPr lang="en-US" sz="1400" dirty="0"/>
+              <a:t>)</a:t>
+            </a:r>
+          </a:p>
+          <a:p>
+            <a:r>
+              <a:rPr lang="en-US" sz="1400" dirty="0"/>
+              <a:t>data("</a:t>
+            </a:r>
+            <a:r>
+              <a:rPr lang="en-US" sz="1400" dirty="0" err="1"/>
+              <a:t>UCBAdmissions</a:t>
+            </a:r>
+            <a:r>
+              <a:rPr lang="en-US" sz="1400" dirty="0"/>
+              <a:t>")</a:t>
+            </a:r>
+          </a:p>
+          <a:p>
+            <a:endParaRPr lang="en-US" sz="1400" dirty="0"/>
+          </a:p>
+          <a:p>
+            <a:r>
+              <a:rPr lang="en-US" sz="1400" dirty="0"/>
+              <a:t>#' ## rearrange dimensions </a:t>
+            </a:r>
+          </a:p>
+          <a:p>
+            <a:r>
+              <a:rPr lang="en-US" sz="1400" dirty="0"/>
+              <a:t>UCB &lt;- </a:t>
+            </a:r>
+            <a:r>
+              <a:rPr lang="en-US" sz="1400" dirty="0" err="1"/>
+              <a:t>aperm</a:t>
+            </a:r>
+            <a:r>
+              <a:rPr lang="en-US" sz="1400" dirty="0"/>
+              <a:t>(</a:t>
+            </a:r>
+            <a:r>
+              <a:rPr lang="en-US" sz="1400" dirty="0" err="1"/>
+              <a:t>UCBAdmissions</a:t>
+            </a:r>
+            <a:r>
+              <a:rPr lang="en-US" sz="1400" dirty="0"/>
+              <a:t>, c(2,1,3))</a:t>
+            </a:r>
+          </a:p>
+          <a:p>
+            <a:r>
+              <a:rPr lang="en-US" sz="1400" dirty="0"/>
+              <a:t># marginal table, collapsing over Dept</a:t>
+            </a:r>
+          </a:p>
+          <a:p>
+            <a:r>
+              <a:rPr lang="en-US" sz="1400" dirty="0"/>
+              <a:t>(UCB2 &lt;- </a:t>
+            </a:r>
+            <a:r>
+              <a:rPr lang="en-US" sz="1400" dirty="0" err="1"/>
+              <a:t>margin.table</a:t>
+            </a:r>
+            <a:r>
+              <a:rPr lang="en-US" sz="1400" dirty="0"/>
+              <a:t>(UCB, c(1,2)))</a:t>
+            </a:r>
+          </a:p>
+          <a:p>
+            <a:endParaRPr lang="en-US" sz="1400" dirty="0"/>
+          </a:p>
+          <a:p>
+            <a:r>
+              <a:rPr lang="en-US" sz="1400" dirty="0"/>
+              <a:t>#’ ##  </a:t>
+            </a:r>
+            <a:r>
+              <a:rPr lang="en-US" sz="1400" dirty="0" err="1"/>
+              <a:t>Chisquare</a:t>
+            </a:r>
+            <a:r>
+              <a:rPr lang="en-US" sz="1400" dirty="0"/>
+              <a:t> test, $\chi^2$</a:t>
+            </a:r>
+          </a:p>
+          <a:p>
+            <a:r>
+              <a:rPr lang="en-US" sz="1400" dirty="0" err="1"/>
+              <a:t>chisq.test</a:t>
+            </a:r>
+            <a:r>
+              <a:rPr lang="en-US" sz="1400" dirty="0"/>
+              <a:t>(UCB2)</a:t>
+            </a:r>
+          </a:p>
+        </p:txBody>
+      </p:sp>
+      <p:sp>
+        <p:nvSpPr>
+          <p:cNvPr id="5" name="TextBox 4">
+            <a:extLst>
+              <a:ext uri="{FF2B5EF4-FFF2-40B4-BE49-F238E27FC236}">
+                <a16:creationId xmlns:a16="http://schemas.microsoft.com/office/drawing/2014/main" id="{1F84B91E-6822-46BB-88CF-1456097FFEDE}"/>
+              </a:ext>
+            </a:extLst>
+          </p:cNvPr>
+          <p:cNvSpPr txBox="1"/>
+          <p:nvPr/>
+        </p:nvSpPr>
+        <p:spPr>
+          <a:xfrm>
+            <a:off x="5181600" y="1371600"/>
+            <a:ext cx="3505200" cy="2308324"/>
           </a:xfrm>
           <a:prstGeom prst="rect">
             <a:avLst/>
           </a:prstGeom>
           <a:noFill/>
-          <a:extLst>
-            <a:ext uri="{909E8E84-426E-40DD-AFC4-6F175D3DCCD1}">
-              <a14:hiddenFill xmlns:a14="http://schemas.microsoft.com/office/drawing/2010/main">
+        </p:spPr>
+        <p:txBody>
+          <a:bodyPr wrap="square" rtlCol="0">
+            <a:spAutoFit/>
+          </a:bodyPr>
+          <a:lstStyle/>
+          <a:p>
+            <a:r>
+              <a:rPr lang="en-US" dirty="0"/>
+              <a:t>In R scripts you can use special comments (</a:t>
+            </a:r>
+            <a:r>
+              <a:rPr lang="en-US" b="1" dirty="0">
                 <a:solidFill>
-                  <a:srgbClr val="FFFFFF"/>
+                  <a:schemeClr val="accent6">
+                    <a:lumMod val="50000"/>
+                  </a:schemeClr>
                 </a:solidFill>
-              </a14:hiddenFill>
-            </a:ext>
-          </a:extLst>
-        </p:spPr>
-      </p:pic>
-      <p:sp>
-        <p:nvSpPr>
-          <p:cNvPr id="7" name="TextBox 6"/>
+                <a:latin typeface="Courier New" panose="02070309020205020404" pitchFamily="49" charset="0"/>
+                <a:cs typeface="Courier New" panose="02070309020205020404" pitchFamily="49" charset="0"/>
+              </a:rPr>
+              <a:t>#’</a:t>
+            </a:r>
+            <a:r>
+              <a:rPr lang="en-US" dirty="0"/>
+              <a:t>) to add headings, text, math, with output to HTML, Word, PDF, …</a:t>
+            </a:r>
+          </a:p>
+          <a:p>
+            <a:endParaRPr lang="en-US" dirty="0"/>
+          </a:p>
+          <a:p>
+            <a:r>
+              <a:rPr lang="en-US" dirty="0"/>
+              <a:t>File -&gt; Compile Report (Ctrl-Shift-K)</a:t>
+            </a:r>
+          </a:p>
+          <a:p>
+            <a:r>
+              <a:rPr lang="en-US" dirty="0"/>
+              <a:t>runs the script and produces a report with all the output</a:t>
+            </a:r>
+          </a:p>
+        </p:txBody>
+      </p:sp>
+      <p:sp>
+        <p:nvSpPr>
+          <p:cNvPr id="6" name="TextBox 5">
+            <a:extLst>
+              <a:ext uri="{FF2B5EF4-FFF2-40B4-BE49-F238E27FC236}">
+                <a16:creationId xmlns:a16="http://schemas.microsoft.com/office/drawing/2014/main" id="{E741BF9D-E944-48D8-A1A9-21909530A97B}"/>
+              </a:ext>
+            </a:extLst>
+          </p:cNvPr>
           <p:cNvSpPr txBox="1"/>
           <p:nvPr/>
         </p:nvSpPr>
         <p:spPr>
           <a:xfrm>
-            <a:off x="3657600" y="2514600"/>
-            <a:ext cx="4724400" cy="1107996"/>
+            <a:off x="3670434" y="5277375"/>
+            <a:ext cx="1347537" cy="523220"/>
           </a:xfrm>
           <a:prstGeom prst="rect">
             <a:avLst/>
@@ -7066,71 +8315,42 @@
           <a:lstStyle/>
           <a:p>
             <a:r>
-              <a:rPr lang="en-US" dirty="0"/>
-              <a:t>The basic R system: R console (GUI) &amp; packages</a:t>
-            </a:r>
-          </a:p>
-          <a:p>
-            <a:r>
-              <a:rPr lang="en-US" dirty="0"/>
-              <a:t>Download: </a:t>
-            </a:r>
-            <a:r>
-              <a:rPr lang="en-US" dirty="0">
-                <a:hlinkClick r:id="rId3"/>
+              <a:rPr lang="en-US" sz="1400" dirty="0">
+                <a:solidFill>
+                  <a:srgbClr val="FF0000"/>
+                </a:solidFill>
               </a:rPr>
-              <a:t>http://cran.us.r-project.org/</a:t>
-            </a:r>
-            <a:endParaRPr lang="en-US" dirty="0"/>
-          </a:p>
-          <a:p>
-            <a:r>
-              <a:rPr lang="en-US" b="1" dirty="0"/>
-              <a:t>Add</a:t>
-            </a:r>
-            <a:r>
-              <a:rPr lang="en-US" dirty="0"/>
-              <a:t> my recommended packages: </a:t>
-            </a:r>
-            <a:r>
-              <a:rPr lang="en-US" sz="1200" dirty="0"/>
-              <a:t>source(</a:t>
-            </a:r>
-            <a:r>
-              <a:rPr lang="en-US" sz="1200" dirty="0">
-                <a:hlinkClick r:id="rId4"/>
+              <a:t>Math notation</a:t>
+            </a:r>
+          </a:p>
+          <a:p>
+            <a:r>
+              <a:rPr lang="en-US" sz="1400" dirty="0">
+                <a:solidFill>
+                  <a:srgbClr val="FF0000"/>
+                </a:solidFill>
               </a:rPr>
-              <a:t>“</a:t>
-            </a:r>
-            <a:r>
-              <a:rPr lang="en-US" sz="1200" dirty="0">
-                <a:hlinkClick r:id="rId5"/>
-              </a:rPr>
-              <a:t>http://euclid.psych.yorku.ca/www/psy6135/R/install-</a:t>
-            </a:r>
-            <a:r>
-              <a:rPr lang="en-US" sz="1200" dirty="0" err="1">
-                <a:hlinkClick r:id="rId5"/>
-              </a:rPr>
-              <a:t>pkgs.R</a:t>
-            </a:r>
-            <a:r>
-              <a:rPr lang="en-US" sz="1200" dirty="0"/>
-              <a:t> ”)</a:t>
-            </a:r>
-          </a:p>
-        </p:txBody>
-      </p:sp>
-      <p:sp>
-        <p:nvSpPr>
-          <p:cNvPr id="8" name="TextBox 7"/>
+              <a:t>(LaTeX)</a:t>
+            </a:r>
+          </a:p>
+        </p:txBody>
+      </p:sp>
+      <p:sp>
+        <p:nvSpPr>
+          <p:cNvPr id="7" name="TextBox 6">
+            <a:extLst>
+              <a:ext uri="{FF2B5EF4-FFF2-40B4-BE49-F238E27FC236}">
+                <a16:creationId xmlns:a16="http://schemas.microsoft.com/office/drawing/2014/main" id="{4489E2BC-09CD-440D-95F6-0DAF303BA230}"/>
+              </a:ext>
+            </a:extLst>
+          </p:cNvPr>
           <p:cNvSpPr txBox="1"/>
           <p:nvPr/>
         </p:nvSpPr>
         <p:spPr>
           <a:xfrm>
-            <a:off x="3657600" y="4099295"/>
-            <a:ext cx="4724400" cy="1077218"/>
+            <a:off x="3711341" y="2057400"/>
+            <a:ext cx="1143000" cy="307777"/>
           </a:xfrm>
           <a:prstGeom prst="rect">
             <a:avLst/>
@@ -7144,110 +8364,59 @@
           <a:lstStyle/>
           <a:p>
             <a:r>
-              <a:rPr lang="en-US" dirty="0"/>
-              <a:t>The R Studio IDE: analyze, write, publish</a:t>
-            </a:r>
-          </a:p>
-          <a:p>
-            <a:r>
-              <a:rPr lang="en-US" dirty="0"/>
-              <a:t>Download: </a:t>
-            </a:r>
-            <a:r>
               <a:rPr lang="en-US" sz="1400" dirty="0">
-                <a:hlinkClick r:id="rId6"/>
+                <a:solidFill>
+                  <a:srgbClr val="FF0000"/>
+                </a:solidFill>
               </a:rPr>
-              <a:t>https://www.rstudio.com/products/rstudio/download/</a:t>
-            </a:r>
-            <a:endParaRPr lang="en-US" sz="1400" dirty="0"/>
-          </a:p>
-          <a:p>
-            <a:r>
-              <a:rPr lang="en-US" sz="1400" b="1" dirty="0"/>
-              <a:t>Add</a:t>
-            </a:r>
-            <a:r>
-              <a:rPr lang="en-US" sz="1400" dirty="0"/>
-              <a:t>: R Studio-related packages, as useful</a:t>
-            </a:r>
-          </a:p>
-        </p:txBody>
-      </p:sp>
-      <p:pic>
-        <p:nvPicPr>
-          <p:cNvPr id="1026" name="Picture 2" descr="https://www.rstudio.com/wp-content/uploads/2015/06/Rlogonew.png"/>
-          <p:cNvPicPr>
-            <a:picLocks noChangeAspect="1" noChangeArrowheads="1"/>
-          </p:cNvPicPr>
-          <p:nvPr/>
-        </p:nvPicPr>
-        <p:blipFill>
-          <a:blip r:embed="rId7">
+              <a:t>YAML header</a:t>
+            </a:r>
+          </a:p>
+        </p:txBody>
+      </p:sp>
+      <p:sp>
+        <p:nvSpPr>
+          <p:cNvPr id="8" name="TextBox 7">
             <a:extLst>
-              <a:ext uri="{28A0092B-C50C-407E-A947-70E740481C1C}">
-                <a14:useLocalDpi xmlns:a14="http://schemas.microsoft.com/office/drawing/2010/main" val="0"/>
+              <a:ext uri="{FF2B5EF4-FFF2-40B4-BE49-F238E27FC236}">
+                <a16:creationId xmlns:a16="http://schemas.microsoft.com/office/drawing/2014/main" id="{B8625ED5-7442-493A-B5AD-8C738C7CB6F7}"/>
               </a:ext>
             </a:extLst>
-          </a:blip>
-          <a:srcRect/>
-          <a:stretch>
-            <a:fillRect/>
-          </a:stretch>
-        </p:blipFill>
-        <p:spPr bwMode="auto">
-          <a:xfrm>
-            <a:off x="783169" y="2514600"/>
-            <a:ext cx="1905000" cy="1476375"/>
+          </p:cNvPr>
+          <p:cNvSpPr txBox="1"/>
+          <p:nvPr/>
+        </p:nvSpPr>
+        <p:spPr>
+          <a:xfrm>
+            <a:off x="3709737" y="3378869"/>
+            <a:ext cx="1143000" cy="307777"/>
           </a:xfrm>
           <a:prstGeom prst="rect">
             <a:avLst/>
           </a:prstGeom>
           <a:noFill/>
-          <a:extLst>
-            <a:ext uri="{909E8E84-426E-40DD-AFC4-6F175D3DCCD1}">
-              <a14:hiddenFill xmlns:a14="http://schemas.microsoft.com/office/drawing/2010/main">
+        </p:spPr>
+        <p:txBody>
+          <a:bodyPr wrap="square" rtlCol="0">
+            <a:spAutoFit/>
+          </a:bodyPr>
+          <a:lstStyle/>
+          <a:p>
+            <a:r>
+              <a:rPr lang="en-US" sz="1400" dirty="0">
                 <a:solidFill>
-                  <a:srgbClr val="FFFFFF"/>
+                  <a:srgbClr val="FF0000"/>
                 </a:solidFill>
-              </a14:hiddenFill>
-            </a:ext>
-          </a:extLst>
-        </p:spPr>
-      </p:pic>
-      <p:pic>
-        <p:nvPicPr>
-          <p:cNvPr id="5" name="Picture 4"/>
-          <p:cNvPicPr>
-            <a:picLocks noChangeAspect="1"/>
-          </p:cNvPicPr>
-          <p:nvPr/>
-        </p:nvPicPr>
-        <p:blipFill>
-          <a:blip r:embed="rId8">
-            <a:extLst>
-              <a:ext uri="{28A0092B-C50C-407E-A947-70E740481C1C}">
-                <a14:useLocalDpi xmlns:a14="http://schemas.microsoft.com/office/drawing/2010/main" val="0"/>
-              </a:ext>
-            </a:extLst>
-          </a:blip>
-          <a:stretch>
-            <a:fillRect/>
-          </a:stretch>
-        </p:blipFill>
-        <p:spPr>
-          <a:xfrm>
-            <a:off x="3810000" y="5257800"/>
-            <a:ext cx="1376363" cy="1157288"/>
-          </a:xfrm>
-          <a:prstGeom prst="rect">
-            <a:avLst/>
-          </a:prstGeom>
-        </p:spPr>
-      </p:pic>
+              </a:rPr>
+              <a:t>Heading</a:t>
+            </a:r>
+          </a:p>
+        </p:txBody>
+      </p:sp>
     </p:spTree>
     <p:extLst>
       <p:ext uri="{BB962C8B-B14F-4D97-AF65-F5344CB8AC3E}">
-        <p14:creationId xmlns:p14="http://schemas.microsoft.com/office/powerpoint/2010/main" val="589838839"/>
+        <p14:creationId xmlns:p14="http://schemas.microsoft.com/office/powerpoint/2010/main" val="3691303170"/>
       </p:ext>
     </p:extLst>
   </p:cSld>
@@ -9490,7 +10659,7 @@
               <a:rPr lang="en-US" sz="1600" dirty="0">
                 <a:latin typeface="Arial Narrow" panose="020B0606020202030204" pitchFamily="34" charset="0"/>
               </a:rPr>
-              <a:t>[1] "C:/Dropbox/Documents/6135"</a:t>
+              <a:t>[1] "C:/Dropbox/Documents/6136"</a:t>
             </a:r>
           </a:p>
         </p:txBody>
@@ -10215,13 +11384,53 @@
           <a:p>
             <a:r>
               <a:rPr lang="en-US" dirty="0"/>
-              <a:t>Use a separate folder for each project</a:t>
-            </a:r>
-          </a:p>
-          <a:p>
+              <a:t>Use a</a:t>
+            </a:r>
+            <a:r>
+              <a:rPr lang="en-US" dirty="0">
+                <a:solidFill>
+                  <a:srgbClr val="0070C0"/>
+                </a:solidFill>
+              </a:rPr>
+              <a:t> separate </a:t>
+            </a:r>
             <a:r>
               <a:rPr lang="en-US" dirty="0"/>
-              <a:t>Use sub-folders for various parts</a:t>
+              <a:t>folder for each </a:t>
+            </a:r>
+            <a:r>
+              <a:rPr lang="en-US" dirty="0">
+                <a:solidFill>
+                  <a:srgbClr val="0070C0"/>
+                </a:solidFill>
+              </a:rPr>
+              <a:t>project</a:t>
+            </a:r>
+          </a:p>
+          <a:p>
+            <a:r>
+              <a:rPr lang="en-US" dirty="0"/>
+              <a:t>Use </a:t>
+            </a:r>
+            <a:r>
+              <a:rPr lang="en-US" dirty="0">
+                <a:solidFill>
+                  <a:srgbClr val="0070C0"/>
+                </a:solidFill>
+              </a:rPr>
+              <a:t>sub-folders</a:t>
+            </a:r>
+            <a:r>
+              <a:rPr lang="en-US" dirty="0"/>
+              <a:t> for various </a:t>
+            </a:r>
+            <a:r>
+              <a:rPr lang="en-US" dirty="0">
+                <a:solidFill>
+                  <a:srgbClr val="0070C0"/>
+                </a:solidFill>
+              </a:rPr>
+              <a:t>parts</a:t>
             </a:r>
           </a:p>
           <a:p>

</xml_diff>